<commit_message>
updated instructions and display text
</commit_message>
<xml_diff>
--- a/src/EngMain/Stimuli/Instructions.pptx
+++ b/src/EngMain/Stimuli/Instructions.pptx
@@ -20,8 +20,6 @@
     <p:sldId id="293" r:id="rId14"/>
     <p:sldId id="298" r:id="rId15"/>
     <p:sldId id="299" r:id="rId16"/>
-    <p:sldId id="300" r:id="rId17"/>
-    <p:sldId id="301" r:id="rId18"/>
   </p:sldIdLst>
   <p:sldSz cx="12192000" cy="6858000"/>
   <p:notesSz cx="6858000" cy="9144000"/>
@@ -277,7 +275,7 @@
           <a:p>
             <a:fld id="{F94CC130-BC3E-4493-B419-9ABD77C45A17}" type="datetimeFigureOut">
               <a:rPr lang="en-GB" smtClean="0"/>
-              <a:t>19/07/2020</a:t>
+              <a:t>20/07/2020</a:t>
             </a:fld>
             <a:endParaRPr lang="en-GB"/>
           </a:p>
@@ -331,7 +329,7 @@
           <a:p>
             <a:fld id="{23A1E018-BB3E-4D99-A825-AA4FBD421AD5}" type="slidenum">
               <a:rPr lang="en-GB" smtClean="0"/>
-              <a:t>‹N°›</a:t>
+              <a:t>‹#›</a:t>
             </a:fld>
             <a:endParaRPr lang="en-GB"/>
           </a:p>
@@ -477,7 +475,7 @@
           <a:p>
             <a:fld id="{F94CC130-BC3E-4493-B419-9ABD77C45A17}" type="datetimeFigureOut">
               <a:rPr lang="en-GB" smtClean="0"/>
-              <a:t>19/07/2020</a:t>
+              <a:t>20/07/2020</a:t>
             </a:fld>
             <a:endParaRPr lang="en-GB"/>
           </a:p>
@@ -531,7 +529,7 @@
           <a:p>
             <a:fld id="{23A1E018-BB3E-4D99-A825-AA4FBD421AD5}" type="slidenum">
               <a:rPr lang="en-GB" smtClean="0"/>
-              <a:t>‹N°›</a:t>
+              <a:t>‹#›</a:t>
             </a:fld>
             <a:endParaRPr lang="en-GB"/>
           </a:p>
@@ -687,7 +685,7 @@
           <a:p>
             <a:fld id="{F94CC130-BC3E-4493-B419-9ABD77C45A17}" type="datetimeFigureOut">
               <a:rPr lang="en-GB" smtClean="0"/>
-              <a:t>19/07/2020</a:t>
+              <a:t>20/07/2020</a:t>
             </a:fld>
             <a:endParaRPr lang="en-GB"/>
           </a:p>
@@ -741,7 +739,7 @@
           <a:p>
             <a:fld id="{23A1E018-BB3E-4D99-A825-AA4FBD421AD5}" type="slidenum">
               <a:rPr lang="en-GB" smtClean="0"/>
-              <a:t>‹N°›</a:t>
+              <a:t>‹#›</a:t>
             </a:fld>
             <a:endParaRPr lang="en-GB"/>
           </a:p>
@@ -887,7 +885,7 @@
           <a:p>
             <a:fld id="{F94CC130-BC3E-4493-B419-9ABD77C45A17}" type="datetimeFigureOut">
               <a:rPr lang="en-GB" smtClean="0"/>
-              <a:t>19/07/2020</a:t>
+              <a:t>20/07/2020</a:t>
             </a:fld>
             <a:endParaRPr lang="en-GB"/>
           </a:p>
@@ -941,7 +939,7 @@
           <a:p>
             <a:fld id="{23A1E018-BB3E-4D99-A825-AA4FBD421AD5}" type="slidenum">
               <a:rPr lang="en-GB" smtClean="0"/>
-              <a:t>‹N°›</a:t>
+              <a:t>‹#›</a:t>
             </a:fld>
             <a:endParaRPr lang="en-GB"/>
           </a:p>
@@ -1163,7 +1161,7 @@
           <a:p>
             <a:fld id="{F94CC130-BC3E-4493-B419-9ABD77C45A17}" type="datetimeFigureOut">
               <a:rPr lang="en-GB" smtClean="0"/>
-              <a:t>19/07/2020</a:t>
+              <a:t>20/07/2020</a:t>
             </a:fld>
             <a:endParaRPr lang="en-GB"/>
           </a:p>
@@ -1217,7 +1215,7 @@
           <a:p>
             <a:fld id="{23A1E018-BB3E-4D99-A825-AA4FBD421AD5}" type="slidenum">
               <a:rPr lang="en-GB" smtClean="0"/>
-              <a:t>‹N°›</a:t>
+              <a:t>‹#›</a:t>
             </a:fld>
             <a:endParaRPr lang="en-GB"/>
           </a:p>
@@ -1431,7 +1429,7 @@
           <a:p>
             <a:fld id="{F94CC130-BC3E-4493-B419-9ABD77C45A17}" type="datetimeFigureOut">
               <a:rPr lang="en-GB" smtClean="0"/>
-              <a:t>19/07/2020</a:t>
+              <a:t>20/07/2020</a:t>
             </a:fld>
             <a:endParaRPr lang="en-GB"/>
           </a:p>
@@ -1485,7 +1483,7 @@
           <a:p>
             <a:fld id="{23A1E018-BB3E-4D99-A825-AA4FBD421AD5}" type="slidenum">
               <a:rPr lang="en-GB" smtClean="0"/>
-              <a:t>‹N°›</a:t>
+              <a:t>‹#›</a:t>
             </a:fld>
             <a:endParaRPr lang="en-GB"/>
           </a:p>
@@ -1846,7 +1844,7 @@
           <a:p>
             <a:fld id="{F94CC130-BC3E-4493-B419-9ABD77C45A17}" type="datetimeFigureOut">
               <a:rPr lang="en-GB" smtClean="0"/>
-              <a:t>19/07/2020</a:t>
+              <a:t>20/07/2020</a:t>
             </a:fld>
             <a:endParaRPr lang="en-GB"/>
           </a:p>
@@ -1900,7 +1898,7 @@
           <a:p>
             <a:fld id="{23A1E018-BB3E-4D99-A825-AA4FBD421AD5}" type="slidenum">
               <a:rPr lang="en-GB" smtClean="0"/>
-              <a:t>‹N°›</a:t>
+              <a:t>‹#›</a:t>
             </a:fld>
             <a:endParaRPr lang="en-GB"/>
           </a:p>
@@ -1988,7 +1986,7 @@
           <a:p>
             <a:fld id="{F94CC130-BC3E-4493-B419-9ABD77C45A17}" type="datetimeFigureOut">
               <a:rPr lang="en-GB" smtClean="0"/>
-              <a:t>19/07/2020</a:t>
+              <a:t>20/07/2020</a:t>
             </a:fld>
             <a:endParaRPr lang="en-GB"/>
           </a:p>
@@ -2042,7 +2040,7 @@
           <a:p>
             <a:fld id="{23A1E018-BB3E-4D99-A825-AA4FBD421AD5}" type="slidenum">
               <a:rPr lang="en-GB" smtClean="0"/>
-              <a:t>‹N°›</a:t>
+              <a:t>‹#›</a:t>
             </a:fld>
             <a:endParaRPr lang="en-GB"/>
           </a:p>
@@ -2101,7 +2099,7 @@
           <a:p>
             <a:fld id="{F94CC130-BC3E-4493-B419-9ABD77C45A17}" type="datetimeFigureOut">
               <a:rPr lang="en-GB" smtClean="0"/>
-              <a:t>19/07/2020</a:t>
+              <a:t>20/07/2020</a:t>
             </a:fld>
             <a:endParaRPr lang="en-GB"/>
           </a:p>
@@ -2155,7 +2153,7 @@
           <a:p>
             <a:fld id="{23A1E018-BB3E-4D99-A825-AA4FBD421AD5}" type="slidenum">
               <a:rPr lang="en-GB" smtClean="0"/>
-              <a:t>‹N°›</a:t>
+              <a:t>‹#›</a:t>
             </a:fld>
             <a:endParaRPr lang="en-GB"/>
           </a:p>
@@ -2414,7 +2412,7 @@
           <a:p>
             <a:fld id="{F94CC130-BC3E-4493-B419-9ABD77C45A17}" type="datetimeFigureOut">
               <a:rPr lang="en-GB" smtClean="0"/>
-              <a:t>19/07/2020</a:t>
+              <a:t>20/07/2020</a:t>
             </a:fld>
             <a:endParaRPr lang="en-GB"/>
           </a:p>
@@ -2468,7 +2466,7 @@
           <a:p>
             <a:fld id="{23A1E018-BB3E-4D99-A825-AA4FBD421AD5}" type="slidenum">
               <a:rPr lang="en-GB" smtClean="0"/>
-              <a:t>‹N°›</a:t>
+              <a:t>‹#›</a:t>
             </a:fld>
             <a:endParaRPr lang="en-GB"/>
           </a:p>
@@ -2703,7 +2701,7 @@
           <a:p>
             <a:fld id="{F94CC130-BC3E-4493-B419-9ABD77C45A17}" type="datetimeFigureOut">
               <a:rPr lang="en-GB" smtClean="0"/>
-              <a:t>19/07/2020</a:t>
+              <a:t>20/07/2020</a:t>
             </a:fld>
             <a:endParaRPr lang="en-GB"/>
           </a:p>
@@ -2757,7 +2755,7 @@
           <a:p>
             <a:fld id="{23A1E018-BB3E-4D99-A825-AA4FBD421AD5}" type="slidenum">
               <a:rPr lang="en-GB" smtClean="0"/>
-              <a:t>‹N°›</a:t>
+              <a:t>‹#›</a:t>
             </a:fld>
             <a:endParaRPr lang="en-GB"/>
           </a:p>
@@ -2946,7 +2944,7 @@
           <a:p>
             <a:fld id="{F94CC130-BC3E-4493-B419-9ABD77C45A17}" type="datetimeFigureOut">
               <a:rPr lang="en-GB" smtClean="0"/>
-              <a:t>19/07/2020</a:t>
+              <a:t>20/07/2020</a:t>
             </a:fld>
             <a:endParaRPr lang="en-GB"/>
           </a:p>
@@ -3036,7 +3034,7 @@
           <a:p>
             <a:fld id="{23A1E018-BB3E-4D99-A825-AA4FBD421AD5}" type="slidenum">
               <a:rPr lang="en-GB" smtClean="0"/>
-              <a:t>‹N°›</a:t>
+              <a:t>‹#›</a:t>
             </a:fld>
             <a:endParaRPr lang="en-GB"/>
           </a:p>
@@ -3387,38 +3385,25 @@
           <a:p>
             <a:pPr algn="ctr"/>
             <a:r>
-              <a:rPr lang="fr-FR" sz="2400" b="1" dirty="0" smtClean="0">
+              <a:rPr lang="fr-FR" sz="2400" b="1" dirty="0">
                 <a:solidFill>
                   <a:srgbClr val="0070C0"/>
                 </a:solidFill>
               </a:rPr>
-              <a:t>TEST </a:t>
-            </a:r>
-            <a:r>
-              <a:rPr lang="fr-FR" sz="2400" b="1" dirty="0" smtClean="0">
-                <a:solidFill>
-                  <a:srgbClr val="0070C0"/>
-                </a:solidFill>
-              </a:rPr>
-              <a:t>DE CHARGE MENTALE:</a:t>
-            </a:r>
-            <a:endParaRPr lang="fr-FR" sz="2400" b="1" dirty="0" smtClean="0">
-              <a:solidFill>
-                <a:srgbClr val="0070C0"/>
-              </a:solidFill>
-            </a:endParaRPr>
+              <a:t>TEST D’ENGAGEMENT:</a:t>
+            </a:r>
           </a:p>
           <a:p>
             <a:pPr algn="ctr"/>
             <a:r>
-              <a:rPr lang="fr-FR" sz="2400" b="1" dirty="0" smtClean="0">
+              <a:rPr lang="fr-FR" sz="2400" b="1" dirty="0">
                 <a:solidFill>
                   <a:srgbClr val="0070C0"/>
                 </a:solidFill>
               </a:rPr>
               <a:t>INSTRUCTIONS</a:t>
             </a:r>
-            <a:endParaRPr lang="en-GB" sz="2400" b="1" dirty="0" smtClean="0">
+            <a:endParaRPr lang="en-GB" sz="2400" b="1" dirty="0">
               <a:solidFill>
                 <a:srgbClr val="0070C0"/>
               </a:solidFill>
@@ -3461,38 +3446,37 @@
               </a:lnSpc>
             </a:pPr>
             <a:r>
-              <a:rPr lang="en-GB" sz="2400" dirty="0" err="1" smtClean="0"/>
+              <a:rPr lang="en-GB" sz="2400" dirty="0" err="1"/>
               <a:t>Veuillez</a:t>
             </a:r>
             <a:r>
-              <a:rPr lang="en-GB" sz="2400" dirty="0" smtClean="0"/>
+              <a:rPr lang="en-GB" sz="2400" dirty="0"/>
               <a:t> lire </a:t>
             </a:r>
             <a:r>
-              <a:rPr lang="en-GB" sz="2400" dirty="0" err="1" smtClean="0"/>
+              <a:rPr lang="en-GB" sz="2400" dirty="0" err="1"/>
               <a:t>attentivement</a:t>
             </a:r>
             <a:r>
-              <a:rPr lang="en-GB" sz="2400" dirty="0" smtClean="0"/>
+              <a:rPr lang="en-GB" sz="2400" dirty="0"/>
               <a:t> les instructions qui </a:t>
             </a:r>
             <a:r>
-              <a:rPr lang="en-GB" sz="2400" dirty="0" err="1" smtClean="0"/>
+              <a:rPr lang="en-GB" sz="2400" dirty="0" err="1"/>
               <a:t>vont</a:t>
             </a:r>
             <a:r>
-              <a:rPr lang="en-GB" sz="2400" dirty="0" smtClean="0"/>
+              <a:rPr lang="en-GB" sz="2400" dirty="0"/>
               <a:t> </a:t>
             </a:r>
             <a:r>
-              <a:rPr lang="en-GB" sz="2400" dirty="0" err="1" smtClean="0"/>
+              <a:rPr lang="en-GB" sz="2400" dirty="0" err="1"/>
               <a:t>suivre</a:t>
             </a:r>
             <a:r>
-              <a:rPr lang="en-GB" sz="2400" dirty="0" smtClean="0"/>
+              <a:rPr lang="en-GB" sz="2400" dirty="0"/>
               <a:t>.</a:t>
             </a:r>
-            <a:endParaRPr lang="en-GB" sz="2400" dirty="0"/>
           </a:p>
           <a:p>
             <a:pPr algn="ctr">
@@ -3501,16 +3485,12 @@
               </a:lnSpc>
             </a:pPr>
             <a:r>
-              <a:rPr lang="en-GB" sz="2400" dirty="0" err="1" smtClean="0"/>
+              <a:rPr lang="en-GB" sz="2400" dirty="0" err="1"/>
               <a:t>Appuyez</a:t>
             </a:r>
             <a:r>
-              <a:rPr lang="en-GB" sz="2400" dirty="0" smtClean="0"/>
-              <a:t> </a:t>
-            </a:r>
-            <a:r>
-              <a:rPr lang="en-GB" sz="2400" dirty="0"/>
-              <a:t>sur </a:t>
+              <a:rPr lang="en-GB" sz="2400" dirty="0"/>
+              <a:t> sur </a:t>
             </a:r>
             <a:r>
               <a:rPr lang="fr-FR" sz="2400" dirty="0"/>
@@ -3521,19 +3501,15 @@
               <a:t>la </a:t>
             </a:r>
             <a:r>
-              <a:rPr lang="en-GB" sz="2400" dirty="0" err="1" smtClean="0"/>
+              <a:rPr lang="en-GB" sz="2400" dirty="0" err="1"/>
               <a:t>flèche</a:t>
             </a:r>
             <a:r>
-              <a:rPr lang="en-GB" sz="2400" dirty="0" smtClean="0"/>
-              <a:t> </a:t>
-            </a:r>
-            <a:r>
-              <a:rPr lang="en-GB" sz="2400" dirty="0"/>
-              <a:t>de </a:t>
-            </a:r>
-            <a:r>
-              <a:rPr lang="en-GB" sz="2400" dirty="0" err="1" smtClean="0"/>
+              <a:rPr lang="en-GB" sz="2400" dirty="0"/>
+              <a:t> de </a:t>
+            </a:r>
+            <a:r>
+              <a:rPr lang="en-GB" sz="2400" dirty="0" err="1"/>
               <a:t>droite</a:t>
             </a:r>
             <a:r>
@@ -3542,31 +3518,18 @@
             </a:r>
             <a:r>
               <a:rPr lang="en-GB" sz="2400" dirty="0"/>
-              <a:t> </a:t>
-            </a:r>
-            <a:r>
-              <a:rPr lang="en-GB" sz="2400" dirty="0" smtClean="0"/>
-              <a:t>[</a:t>
-            </a:r>
-            <a:r>
-              <a:rPr lang="en-GB" sz="2400" dirty="0" smtClean="0">
+              <a:t> [</a:t>
+            </a:r>
+            <a:r>
+              <a:rPr lang="en-GB" sz="2400" dirty="0">
                 <a:sym typeface="Wingdings" panose="05000000000000000000" pitchFamily="2" charset="2"/>
               </a:rPr>
               <a:t>] </a:t>
             </a:r>
             <a:r>
-              <a:rPr lang="en-GB" sz="2400" dirty="0" smtClean="0"/>
-              <a:t>pour </a:t>
-            </a:r>
-            <a:r>
-              <a:rPr lang="en-GB" sz="2400" dirty="0"/>
-              <a:t>continuer et lire la </a:t>
-            </a:r>
-            <a:r>
-              <a:rPr lang="en-GB" sz="2400" dirty="0" smtClean="0"/>
-              <a:t>suite.</a:t>
-            </a:r>
-            <a:endParaRPr lang="en-GB" sz="2400" dirty="0"/>
+              <a:rPr lang="en-GB" sz="2400" dirty="0"/>
+              <a:t>pour continuer et lire la suite.</a:t>
+            </a:r>
           </a:p>
           <a:p>
             <a:pPr algn="ctr">
@@ -3591,16 +3554,12 @@
               <a:t>la </a:t>
             </a:r>
             <a:r>
-              <a:rPr lang="en-GB" sz="2400" dirty="0" err="1" smtClean="0"/>
+              <a:rPr lang="en-GB" sz="2400" dirty="0" err="1"/>
               <a:t>flèche</a:t>
             </a:r>
             <a:r>
-              <a:rPr lang="en-GB" sz="2400" dirty="0" smtClean="0"/>
-              <a:t> </a:t>
-            </a:r>
-            <a:r>
-              <a:rPr lang="en-GB" sz="2400" dirty="0"/>
-              <a:t>de gauche </a:t>
+              <a:rPr lang="en-GB" sz="2400" dirty="0"/>
+              <a:t> de gauche </a:t>
             </a:r>
             <a:r>
               <a:rPr lang="fr-FR" sz="2400" dirty="0"/>
@@ -3608,20 +3567,16 @@
             </a:r>
             <a:r>
               <a:rPr lang="en-GB" sz="2400" dirty="0"/>
-              <a:t> </a:t>
-            </a:r>
-            <a:r>
-              <a:rPr lang="en-GB" sz="2400" dirty="0" smtClean="0"/>
-              <a:t>[</a:t>
-            </a:r>
-            <a:r>
-              <a:rPr lang="en-GB" sz="2400" dirty="0" smtClean="0">
+              <a:t> [</a:t>
+            </a:r>
+            <a:r>
+              <a:rPr lang="en-GB" sz="2400" dirty="0">
                 <a:sym typeface="Wingdings" panose="05000000000000000000" pitchFamily="2" charset="2"/>
               </a:rPr>
               <a:t>] </a:t>
             </a:r>
             <a:r>
-              <a:rPr lang="en-GB" sz="2400" dirty="0" smtClean="0"/>
+              <a:rPr lang="en-GB" sz="2400" dirty="0"/>
               <a:t>pour </a:t>
             </a:r>
             <a:r>
@@ -3633,19 +3588,19 @@
               <a:t> et lire </a:t>
             </a:r>
             <a:r>
-              <a:rPr lang="en-GB" sz="2400" dirty="0" err="1" smtClean="0"/>
+              <a:rPr lang="en-GB" sz="2400" dirty="0" err="1"/>
               <a:t>l’instruction</a:t>
             </a:r>
             <a:r>
-              <a:rPr lang="en-GB" sz="2400" dirty="0" smtClean="0"/>
+              <a:rPr lang="en-GB" sz="2400" dirty="0"/>
               <a:t> </a:t>
             </a:r>
             <a:r>
-              <a:rPr lang="en-GB" sz="2400" dirty="0" err="1" smtClean="0"/>
+              <a:rPr lang="en-GB" sz="2400" dirty="0" err="1"/>
               <a:t>précédente</a:t>
             </a:r>
             <a:r>
-              <a:rPr lang="en-GB" sz="2400" dirty="0" smtClean="0"/>
+              <a:rPr lang="en-GB" sz="2400" dirty="0"/>
               <a:t>.</a:t>
             </a:r>
             <a:endParaRPr lang="fr-FR" sz="2400" dirty="0"/>
@@ -3662,13 +3617,6 @@
   <p:clrMapOvr>
     <a:masterClrMapping/>
   </p:clrMapOvr>
-  <p:timing>
-    <p:tnLst>
-      <p:par>
-        <p:cTn id="1" dur="indefinite" restart="never" nodeType="tmRoot"/>
-      </p:par>
-    </p:tnLst>
-  </p:timing>
 </p:sld>
 </file>
 
@@ -3697,8 +3645,8 @@
         </p:nvSpPr>
         <p:spPr>
           <a:xfrm>
-            <a:off x="1278341" y="959327"/>
-            <a:ext cx="9471546" cy="5801588"/>
+            <a:off x="979748" y="1037513"/>
+            <a:ext cx="10232504" cy="5201424"/>
           </a:xfrm>
           <a:prstGeom prst="rect">
             <a:avLst/>
@@ -3717,28 +3665,8 @@
               </a:spcAft>
             </a:pPr>
             <a:r>
-              <a:rPr lang="fr-FR" sz="2400" dirty="0" smtClean="0"/>
-              <a:t>Pour chaque exercice, et quel </a:t>
-            </a:r>
-            <a:r>
               <a:rPr lang="fr-FR" sz="2400" dirty="0"/>
-              <a:t>que soit </a:t>
-            </a:r>
-            <a:r>
-              <a:rPr lang="fr-FR" sz="2400" dirty="0" smtClean="0"/>
-              <a:t>le mode de </a:t>
-            </a:r>
-            <a:r>
-              <a:rPr lang="fr-FR" sz="2400" dirty="0"/>
-              <a:t>difficulté, il y </a:t>
-            </a:r>
-            <a:r>
-              <a:rPr lang="fr-FR" sz="2400" dirty="0" smtClean="0"/>
-              <a:t>a </a:t>
-            </a:r>
-            <a:r>
-              <a:rPr lang="fr-FR" sz="2400" dirty="0"/>
-              <a:t>32 chiffres cibles chiffres à détecter.</a:t>
+              <a:t>Pour chaque exercice, et quel que soit le mode de difficulté, il y a 32 chiffres cibles chiffres à détecter.</a:t>
             </a:r>
           </a:p>
           <a:p>
@@ -3747,7 +3675,7 @@
                 <a:spcPts val="600"/>
               </a:spcAft>
             </a:pPr>
-            <a:endParaRPr lang="fr-FR" sz="2400" dirty="0" smtClean="0"/>
+            <a:endParaRPr lang="fr-FR" sz="1100" dirty="0"/>
           </a:p>
           <a:p>
             <a:pPr algn="ctr">
@@ -3756,40 +3684,8 @@
               </a:spcAft>
             </a:pPr>
             <a:r>
-              <a:rPr lang="fr-FR" sz="2400" dirty="0" smtClean="0"/>
-              <a:t>Pour </a:t>
-            </a:r>
-            <a:r>
               <a:rPr lang="fr-FR" sz="2400" dirty="0"/>
-              <a:t>obtenir le </a:t>
-            </a:r>
-            <a:r>
-              <a:rPr lang="fr-FR" sz="2400" dirty="0" smtClean="0"/>
-              <a:t>bonus, </a:t>
-            </a:r>
-            <a:r>
-              <a:rPr lang="fr-FR" sz="2400" dirty="0"/>
-              <a:t>vous devrez </a:t>
-            </a:r>
-            <a:r>
-              <a:rPr lang="fr-FR" sz="2400" dirty="0" smtClean="0"/>
-              <a:t>détecter </a:t>
-            </a:r>
-            <a:r>
-              <a:rPr lang="fr-FR" sz="2400" dirty="0"/>
-              <a:t>correctement au </a:t>
-            </a:r>
-            <a:r>
-              <a:rPr lang="fr-FR" sz="2400" dirty="0" smtClean="0"/>
-              <a:t>moins </a:t>
-            </a:r>
-            <a:r>
-              <a:rPr lang="fr-FR" sz="2400" dirty="0"/>
-              <a:t>28 chiffres cibles chiffres. Vous devez donc rater moins de 4 cibles</a:t>
-            </a:r>
-            <a:r>
-              <a:rPr lang="fr-FR" sz="2400" dirty="0" smtClean="0"/>
-              <a:t>.</a:t>
+              <a:t>Pour obtenir le bonus, vous devrez détecter correctement au moins 28 chiffres cibles chiffres. Vous devez donc rater strictement moins de 5 cibles.</a:t>
             </a:r>
           </a:p>
           <a:p>
@@ -3799,24 +3695,8 @@
               </a:spcAft>
             </a:pPr>
             <a:r>
-              <a:rPr lang="fr-FR" sz="2400" dirty="0" smtClean="0"/>
-              <a:t>Ce </a:t>
-            </a:r>
-            <a:r>
               <a:rPr lang="fr-FR" sz="2400" dirty="0"/>
-              <a:t>n’est pas tout : appuyer sur la barre espace alors qu’il n’y </a:t>
-            </a:r>
-            <a:r>
-              <a:rPr lang="fr-FR" sz="2400" dirty="0" smtClean="0"/>
-              <a:t>avait </a:t>
-            </a:r>
-            <a:r>
-              <a:rPr lang="fr-FR" sz="2400" dirty="0"/>
-              <a:t>pas de chiffre cible présent sur l’écran est aussi considéré comme une erreur. Pour obtenir le bonus, il vous faudra faire moins de 4 erreurs de ce type</a:t>
-            </a:r>
-            <a:r>
-              <a:rPr lang="fr-FR" sz="2400" dirty="0" smtClean="0"/>
-              <a:t>.</a:t>
+              <a:t>Ce n’est pas tout : appuyer sur la barre espace alors qu’il n’y avait pas de chiffre cible présent sur l’écran est aussi considéré comme une erreur. Pour obtenir le bonus, il vous faudra faire strictement moins de 5 erreurs de ce type.</a:t>
             </a:r>
           </a:p>
           <a:p>
@@ -3825,7 +3705,7 @@
                 <a:spcPts val="600"/>
               </a:spcAft>
             </a:pPr>
-            <a:endParaRPr lang="fr-FR" sz="2400" dirty="0"/>
+            <a:endParaRPr lang="fr-FR" sz="1100" dirty="0"/>
           </a:p>
           <a:p>
             <a:pPr algn="ctr">
@@ -3834,7 +3714,7 @@
               </a:spcAft>
             </a:pPr>
             <a:r>
-              <a:rPr lang="fr-FR" sz="2400" dirty="0" smtClean="0"/>
+              <a:rPr lang="fr-FR" sz="2400" dirty="0"/>
               <a:t>Vous devez donc appuyer sur la barre d’espace si, et seulement si, vous venez d’apercevoir le chiffre cible.</a:t>
             </a:r>
           </a:p>
@@ -3844,7 +3724,7 @@
                 <a:spcPts val="600"/>
               </a:spcAft>
             </a:pPr>
-            <a:endParaRPr lang="fr-FR" sz="2400" dirty="0"/>
+            <a:endParaRPr lang="fr-FR" sz="1100" dirty="0"/>
           </a:p>
           <a:p>
             <a:pPr algn="ctr">
@@ -3853,10 +3733,9 @@
               </a:spcAft>
             </a:pPr>
             <a:r>
-              <a:rPr lang="fr-FR" sz="2400" dirty="0" smtClean="0"/>
+              <a:rPr lang="fr-FR" sz="2400" dirty="0"/>
               <a:t>A la fin de chaque exercice, nous vous indiquerons le nombre d’erreurs que vous avez commises.</a:t>
             </a:r>
-            <a:endParaRPr lang="fr-FR" sz="2400" dirty="0"/>
           </a:p>
         </p:txBody>
       </p:sp>
@@ -3894,18 +3773,13 @@
               </a:spcAft>
             </a:pPr>
             <a:r>
-              <a:rPr lang="en-GB" sz="2400" b="1" dirty="0" smtClean="0">
+              <a:rPr lang="en-GB" sz="2400" b="1" dirty="0">
                 <a:solidFill>
                   <a:srgbClr val="0070C0"/>
                 </a:solidFill>
               </a:rPr>
               <a:t>EXERCICE DE CHARGE MENTALE: CALCUL DU BONUS DE PERFORMANCE</a:t>
             </a:r>
-            <a:endParaRPr lang="en-GB" sz="2400" b="1" dirty="0">
-              <a:solidFill>
-                <a:srgbClr val="0070C0"/>
-              </a:solidFill>
-            </a:endParaRPr>
           </a:p>
         </p:txBody>
       </p:sp>
@@ -3967,202 +3841,127 @@
               </a:spcAft>
             </a:pPr>
             <a:r>
-              <a:rPr lang="en-GB" sz="2400" dirty="0" smtClean="0"/>
+              <a:rPr lang="en-GB" sz="2400" dirty="0"/>
               <a:t>Le test </a:t>
             </a:r>
             <a:r>
-              <a:rPr lang="en-GB" sz="2400" dirty="0" err="1" smtClean="0"/>
+              <a:rPr lang="en-GB" sz="2400" dirty="0" err="1"/>
               <a:t>comprend</a:t>
             </a:r>
             <a:r>
-              <a:rPr lang="en-GB" sz="2400" dirty="0" smtClean="0"/>
+              <a:rPr lang="en-GB" sz="2400" dirty="0"/>
               <a:t> 32 </a:t>
             </a:r>
             <a:r>
-              <a:rPr lang="en-GB" sz="2400" dirty="0" err="1" smtClean="0"/>
+              <a:rPr lang="en-GB" sz="2400" dirty="0" err="1"/>
               <a:t>exercices</a:t>
             </a:r>
             <a:r>
-              <a:rPr lang="en-GB" sz="2400" dirty="0" smtClean="0"/>
+              <a:rPr lang="en-GB" sz="2400" dirty="0"/>
               <a:t> </a:t>
             </a:r>
             <a:r>
-              <a:rPr lang="en-GB" sz="2400" dirty="0" err="1" smtClean="0"/>
+              <a:rPr lang="en-GB" sz="2400" dirty="0" err="1"/>
               <a:t>en</a:t>
             </a:r>
             <a:r>
-              <a:rPr lang="en-GB" sz="2400" dirty="0" smtClean="0"/>
+              <a:rPr lang="en-GB" sz="2400" dirty="0"/>
               <a:t> tout. </a:t>
             </a:r>
             <a:r>
-              <a:rPr lang="en-GB" sz="2400" dirty="0" err="1" smtClean="0"/>
+              <a:rPr lang="en-GB" sz="2400" dirty="0" err="1"/>
               <a:t>Cela</a:t>
             </a:r>
             <a:r>
-              <a:rPr lang="en-GB" sz="2400" dirty="0" smtClean="0"/>
+              <a:rPr lang="en-GB" sz="2400" dirty="0"/>
               <a:t> </a:t>
             </a:r>
             <a:r>
-              <a:rPr lang="en-GB" sz="2400" dirty="0" err="1" smtClean="0"/>
+              <a:rPr lang="en-GB" sz="2400" dirty="0" err="1"/>
               <a:t>dit</a:t>
             </a:r>
             <a:r>
-              <a:rPr lang="en-GB" sz="2400" dirty="0" smtClean="0"/>
+              <a:rPr lang="en-GB" sz="2400" dirty="0"/>
               <a:t>, </a:t>
             </a:r>
             <a:r>
-              <a:rPr lang="en-GB" sz="2400" dirty="0" err="1" smtClean="0"/>
+              <a:rPr lang="en-GB" sz="2400" dirty="0" err="1"/>
               <a:t>vous</a:t>
             </a:r>
             <a:r>
-              <a:rPr lang="en-GB" sz="2400" dirty="0" smtClean="0"/>
+              <a:rPr lang="en-GB" sz="2400" dirty="0"/>
               <a:t> </a:t>
             </a:r>
             <a:r>
-              <a:rPr lang="en-GB" sz="2400" dirty="0" err="1" smtClean="0"/>
+              <a:rPr lang="en-GB" sz="2400" dirty="0" err="1"/>
               <a:t>pouvez</a:t>
             </a:r>
             <a:r>
-              <a:rPr lang="en-GB" sz="2400" dirty="0" smtClean="0"/>
+              <a:rPr lang="en-GB" sz="2400" dirty="0"/>
               <a:t> </a:t>
             </a:r>
             <a:r>
-              <a:rPr lang="en-GB" sz="2400" dirty="0" err="1" smtClean="0"/>
+              <a:rPr lang="en-GB" sz="2400" dirty="0" err="1"/>
               <a:t>gérer</a:t>
             </a:r>
             <a:r>
-              <a:rPr lang="en-GB" sz="2400" dirty="0" smtClean="0"/>
+              <a:rPr lang="en-GB" sz="2400" dirty="0"/>
               <a:t> </a:t>
             </a:r>
             <a:r>
-              <a:rPr lang="en-GB" sz="2400" dirty="0" err="1" smtClean="0"/>
+              <a:rPr lang="en-GB" sz="2400" dirty="0" err="1"/>
               <a:t>votre</a:t>
             </a:r>
             <a:r>
-              <a:rPr lang="en-GB" sz="2400" dirty="0" smtClean="0"/>
+              <a:rPr lang="en-GB" sz="2400" dirty="0"/>
               <a:t> charge </a:t>
             </a:r>
             <a:r>
-              <a:rPr lang="en-GB" sz="2400" dirty="0" err="1" smtClean="0"/>
+              <a:rPr lang="en-GB" sz="2400" dirty="0" err="1"/>
               <a:t>mentale</a:t>
             </a:r>
             <a:r>
-              <a:rPr lang="en-GB" sz="2400" dirty="0" smtClean="0"/>
+              <a:rPr lang="en-GB" sz="2400" dirty="0"/>
               <a:t> </a:t>
             </a:r>
             <a:r>
-              <a:rPr lang="en-GB" sz="2400" dirty="0" err="1" smtClean="0"/>
+              <a:rPr lang="en-GB" sz="2400" dirty="0" err="1"/>
               <a:t>en</a:t>
             </a:r>
             <a:r>
-              <a:rPr lang="en-GB" sz="2400" dirty="0" smtClean="0"/>
+              <a:rPr lang="en-GB" sz="2400" dirty="0"/>
               <a:t> </a:t>
             </a:r>
             <a:r>
-              <a:rPr lang="en-GB" sz="2400" dirty="0" err="1" smtClean="0"/>
+              <a:rPr lang="en-GB" sz="2400" dirty="0" err="1"/>
               <a:t>choisissant</a:t>
             </a:r>
             <a:r>
-              <a:rPr lang="en-GB" sz="2400" dirty="0" smtClean="0"/>
+              <a:rPr lang="en-GB" sz="2400" dirty="0"/>
               <a:t> de ne pas </a:t>
             </a:r>
             <a:r>
-              <a:rPr lang="en-GB" sz="2400" dirty="0" err="1" smtClean="0"/>
+              <a:rPr lang="en-GB" sz="2400" dirty="0" err="1"/>
               <a:t>effectuer</a:t>
             </a:r>
             <a:r>
-              <a:rPr lang="en-GB" sz="2400" dirty="0" smtClean="0"/>
+              <a:rPr lang="en-GB" sz="2400" dirty="0"/>
               <a:t> </a:t>
             </a:r>
             <a:r>
-              <a:rPr lang="en-GB" sz="2400" dirty="0" err="1" smtClean="0"/>
+              <a:rPr lang="en-GB" sz="2400" dirty="0" err="1"/>
               <a:t>certains</a:t>
             </a:r>
             <a:r>
-              <a:rPr lang="en-GB" sz="2400" dirty="0" smtClean="0"/>
+              <a:rPr lang="en-GB" sz="2400" dirty="0"/>
               <a:t> des </a:t>
             </a:r>
             <a:r>
-              <a:rPr lang="en-GB" sz="2400" dirty="0" err="1" smtClean="0"/>
+              <a:rPr lang="en-GB" sz="2400" dirty="0" err="1"/>
               <a:t>exercices</a:t>
             </a:r>
             <a:r>
-              <a:rPr lang="en-GB" sz="2400" dirty="0" smtClean="0"/>
-              <a:t>.</a:t>
-            </a:r>
-          </a:p>
-          <a:p>
-            <a:pPr algn="ctr">
-              <a:spcAft>
-                <a:spcPts val="600"/>
-              </a:spcAft>
-            </a:pPr>
-            <a:endParaRPr lang="en-GB" sz="2400" dirty="0" smtClean="0"/>
-          </a:p>
-          <a:p>
-            <a:pPr algn="ctr">
-              <a:spcAft>
-                <a:spcPts val="600"/>
-              </a:spcAft>
-            </a:pPr>
-            <a:r>
-              <a:rPr lang="en-GB" sz="2400" dirty="0" smtClean="0"/>
-              <a:t>Avant </a:t>
-            </a:r>
-            <a:r>
-              <a:rPr lang="en-GB" sz="2400" dirty="0" err="1"/>
-              <a:t>chaque</a:t>
-            </a:r>
-            <a:r>
-              <a:rPr lang="en-GB" sz="2400" dirty="0"/>
-              <a:t> </a:t>
-            </a:r>
-            <a:r>
-              <a:rPr lang="en-GB" sz="2400" dirty="0" err="1"/>
-              <a:t>exercice</a:t>
-            </a:r>
-            <a:r>
-              <a:rPr lang="en-GB" sz="2400" dirty="0"/>
-              <a:t>, nous </a:t>
-            </a:r>
-            <a:r>
-              <a:rPr lang="en-GB" sz="2400" dirty="0" err="1"/>
-              <a:t>vous</a:t>
-            </a:r>
-            <a:r>
-              <a:rPr lang="en-GB" sz="2400" dirty="0"/>
-              <a:t> </a:t>
-            </a:r>
-            <a:r>
-              <a:rPr lang="en-GB" sz="2400" dirty="0" err="1"/>
-              <a:t>indiquerons</a:t>
-            </a:r>
-            <a:r>
-              <a:rPr lang="en-GB" sz="2400" dirty="0"/>
-              <a:t> </a:t>
-            </a:r>
-            <a:r>
-              <a:rPr lang="en-GB" sz="2400" dirty="0" err="1"/>
-              <a:t>sa</a:t>
-            </a:r>
-            <a:r>
-              <a:rPr lang="en-GB" sz="2400" dirty="0"/>
-              <a:t> </a:t>
-            </a:r>
-            <a:r>
-              <a:rPr lang="en-GB" sz="2400" dirty="0" err="1"/>
-              <a:t>difficulté</a:t>
-            </a:r>
-            <a:r>
-              <a:rPr lang="en-GB" sz="2400" dirty="0"/>
-              <a:t> et le bonus </a:t>
-            </a:r>
-            <a:r>
-              <a:rPr lang="en-GB" sz="2400" dirty="0" err="1" smtClean="0"/>
-              <a:t>associé</a:t>
-            </a:r>
-            <a:r>
-              <a:rPr lang="en-GB" sz="2400" dirty="0" smtClean="0"/>
+              <a:rPr lang="en-GB" sz="2400" dirty="0"/>
               <a:t>.</a:t>
             </a:r>
           </a:p>
@@ -4181,78 +3980,65 @@
               </a:spcAft>
             </a:pPr>
             <a:r>
-              <a:rPr lang="en-GB" sz="2400" dirty="0" err="1"/>
-              <a:t>Vous</a:t>
+              <a:rPr lang="en-GB" sz="2400" dirty="0"/>
+              <a:t>Avant </a:t>
+            </a:r>
+            <a:r>
+              <a:rPr lang="en-GB" sz="2400" dirty="0" err="1"/>
+              <a:t>chaque</a:t>
             </a:r>
             <a:r>
               <a:rPr lang="en-GB" sz="2400" dirty="0"/>
               <a:t> </a:t>
             </a:r>
             <a:r>
-              <a:rPr lang="en-GB" sz="2400" dirty="0" err="1" smtClean="0"/>
-              <a:t>pourrez</a:t>
-            </a:r>
-            <a:r>
-              <a:rPr lang="en-GB" sz="2400" dirty="0" smtClean="0"/>
+              <a:rPr lang="en-GB" sz="2400" dirty="0" err="1"/>
+              <a:t>exercice</a:t>
+            </a:r>
+            <a:r>
+              <a:rPr lang="en-GB" sz="2400" dirty="0"/>
+              <a:t>, nous </a:t>
+            </a:r>
+            <a:r>
+              <a:rPr lang="en-GB" sz="2400" dirty="0" err="1"/>
+              <a:t>vous</a:t>
+            </a:r>
+            <a:r>
+              <a:rPr lang="en-GB" sz="2400" dirty="0"/>
               <a:t> </a:t>
             </a:r>
             <a:r>
               <a:rPr lang="en-GB" sz="2400" dirty="0" err="1"/>
-              <a:t>soit</a:t>
-            </a:r>
-            <a:r>
-              <a:rPr lang="en-GB" sz="2400" dirty="0"/>
-              <a:t> accepter </a:t>
-            </a:r>
-            <a:r>
-              <a:rPr lang="en-GB" sz="2400" dirty="0" err="1" smtClean="0"/>
-              <a:t>d’effectuer</a:t>
-            </a:r>
-            <a:r>
-              <a:rPr lang="en-GB" sz="2400" dirty="0" smtClean="0"/>
+              <a:t>indiquerons</a:t>
+            </a:r>
+            <a:r>
+              <a:rPr lang="en-GB" sz="2400" dirty="0"/>
               <a:t> </a:t>
             </a:r>
             <a:r>
-              <a:rPr lang="en-GB" sz="2400" dirty="0" err="1" smtClean="0"/>
-              <a:t>l’exercice</a:t>
-            </a:r>
-            <a:r>
-              <a:rPr lang="en-GB" sz="2400" dirty="0" smtClean="0"/>
-              <a:t> (</a:t>
-            </a:r>
-            <a:r>
-              <a:rPr lang="en-GB" sz="2400" dirty="0" err="1" smtClean="0"/>
-              <a:t>en</a:t>
-            </a:r>
-            <a:r>
-              <a:rPr lang="en-GB" sz="2400" dirty="0" smtClean="0"/>
+              <a:rPr lang="en-GB" sz="2400" dirty="0" err="1"/>
+              <a:t>sa</a:t>
+            </a:r>
+            <a:r>
+              <a:rPr lang="en-GB" sz="2400" dirty="0"/>
               <a:t> </a:t>
             </a:r>
             <a:r>
               <a:rPr lang="en-GB" sz="2400" dirty="0" err="1"/>
-              <a:t>cliquant</a:t>
-            </a:r>
-            <a:r>
-              <a:rPr lang="en-GB" sz="2400" dirty="0"/>
-              <a:t> </a:t>
-            </a:r>
-            <a:r>
-              <a:rPr lang="fr-FR" sz="2400" dirty="0"/>
-              <a:t>« J’accepte </a:t>
-            </a:r>
-            <a:r>
-              <a:rPr lang="fr-FR" sz="2400" dirty="0" smtClean="0"/>
-              <a:t>»), </a:t>
-            </a:r>
-            <a:r>
-              <a:rPr lang="fr-FR" sz="2400" dirty="0"/>
-              <a:t>soit refuser (en cliquant « Je refuse ») d’effectuer </a:t>
-            </a:r>
-            <a:r>
-              <a:rPr lang="fr-FR" sz="2400" dirty="0" smtClean="0"/>
-              <a:t>l’exercice.</a:t>
-            </a:r>
-            <a:endParaRPr lang="fr-FR" sz="2400" dirty="0"/>
+              <a:t>difficulté</a:t>
+            </a:r>
+            <a:r>
+              <a:rPr lang="en-GB" sz="2400" dirty="0"/>
+              <a:t> et le bonus </a:t>
+            </a:r>
+            <a:r>
+              <a:rPr lang="en-GB" sz="2400" dirty="0" err="1"/>
+              <a:t>associé</a:t>
+            </a:r>
+            <a:r>
+              <a:rPr lang="en-GB" sz="2400" dirty="0"/>
+              <a:t>.</a:t>
+            </a:r>
           </a:p>
           <a:p>
             <a:pPr algn="ctr">
@@ -4269,12 +4055,8 @@
               </a:spcAft>
             </a:pPr>
             <a:r>
-              <a:rPr lang="en-GB" sz="2400" dirty="0"/>
-              <a:t>Si </a:t>
-            </a:r>
-            <a:r>
-              <a:rPr lang="en-GB" sz="2400" dirty="0" err="1"/>
-              <a:t>vous</a:t>
+              <a:rPr lang="en-GB" sz="2400" dirty="0" err="1"/>
+              <a:t>Vous</a:t>
             </a:r>
             <a:r>
               <a:rPr lang="en-GB" sz="2400" dirty="0"/>
@@ -4282,73 +4064,56 @@
             </a:r>
             <a:r>
               <a:rPr lang="en-GB" sz="2400" dirty="0" err="1"/>
-              <a:t>refusez</a:t>
-            </a:r>
-            <a:r>
-              <a:rPr lang="en-GB" sz="2400" dirty="0"/>
-              <a:t>, </a:t>
-            </a:r>
-            <a:r>
-              <a:rPr lang="en-GB" sz="2400" dirty="0" smtClean="0"/>
-              <a:t>et que </a:t>
-            </a:r>
-            <a:r>
-              <a:rPr lang="en-GB" sz="2400" dirty="0" err="1" smtClean="0"/>
-              <a:t>cet</a:t>
-            </a:r>
-            <a:r>
-              <a:rPr lang="en-GB" sz="2400" dirty="0" smtClean="0"/>
+              <a:t>pourrez</a:t>
+            </a:r>
+            <a:r>
+              <a:rPr lang="en-GB" sz="2400" dirty="0"/>
               <a:t> </a:t>
             </a:r>
             <a:r>
-              <a:rPr lang="en-GB" sz="2400" dirty="0" err="1" smtClean="0"/>
-              <a:t>exercice</a:t>
-            </a:r>
-            <a:r>
-              <a:rPr lang="en-GB" sz="2400" dirty="0" smtClean="0"/>
+              <a:rPr lang="en-GB" sz="2400" dirty="0" err="1"/>
+              <a:t>soit</a:t>
+            </a:r>
+            <a:r>
+              <a:rPr lang="en-GB" sz="2400" dirty="0"/>
+              <a:t> accepter </a:t>
+            </a:r>
+            <a:r>
+              <a:rPr lang="en-GB" sz="2400" dirty="0" err="1"/>
+              <a:t>d’effectuer</a:t>
+            </a:r>
+            <a:r>
+              <a:rPr lang="en-GB" sz="2400" dirty="0"/>
               <a:t> </a:t>
             </a:r>
             <a:r>
-              <a:rPr lang="en-GB" sz="2400" dirty="0" err="1" smtClean="0"/>
-              <a:t>est</a:t>
-            </a:r>
-            <a:r>
-              <a:rPr lang="en-GB" sz="2400" dirty="0" smtClean="0"/>
+              <a:rPr lang="en-GB" sz="2400" dirty="0" err="1"/>
+              <a:t>l’exercice</a:t>
+            </a:r>
+            <a:r>
+              <a:rPr lang="en-GB" sz="2400" dirty="0"/>
+              <a:t> (</a:t>
+            </a:r>
+            <a:r>
+              <a:rPr lang="en-GB" sz="2400" dirty="0" err="1"/>
+              <a:t>en</a:t>
+            </a:r>
+            <a:r>
+              <a:rPr lang="en-GB" sz="2400" dirty="0"/>
               <a:t> </a:t>
             </a:r>
             <a:r>
-              <a:rPr lang="en-GB" sz="2400" dirty="0" err="1" smtClean="0"/>
-              <a:t>tiré</a:t>
-            </a:r>
-            <a:r>
-              <a:rPr lang="en-GB" sz="2400" dirty="0" smtClean="0"/>
-              <a:t> au sort, </a:t>
-            </a:r>
-            <a:r>
-              <a:rPr lang="en-GB" sz="2400" dirty="0" err="1" smtClean="0"/>
-              <a:t>vous</a:t>
-            </a:r>
-            <a:r>
-              <a:rPr lang="en-GB" sz="2400" dirty="0" smtClean="0"/>
+              <a:rPr lang="en-GB" sz="2400" dirty="0" err="1"/>
+              <a:t>cliquant</a:t>
+            </a:r>
+            <a:r>
+              <a:rPr lang="en-GB" sz="2400" dirty="0"/>
               <a:t> </a:t>
             </a:r>
             <a:r>
-              <a:rPr lang="en-GB" sz="2400" dirty="0"/>
-              <a:t>ne </a:t>
-            </a:r>
-            <a:r>
               <a:rPr lang="fr-FR" sz="2400" dirty="0"/>
-              <a:t>recevrez</a:t>
-            </a:r>
-            <a:r>
-              <a:rPr lang="en-GB" sz="2400" dirty="0"/>
-              <a:t> pas le </a:t>
-            </a:r>
-            <a:r>
-              <a:rPr lang="en-GB" sz="2400" dirty="0" smtClean="0"/>
-              <a:t>bonus.</a:t>
-            </a:r>
-            <a:endParaRPr lang="en-GB" sz="2400" dirty="0"/>
+              <a:t>« J’accepte »), soit refuser (en cliquant « Je refuse ») d’effectuer l’exercice.</a:t>
+            </a:r>
           </a:p>
           <a:p>
             <a:pPr algn="ctr">
@@ -4365,15 +4130,98 @@
               </a:spcAft>
             </a:pPr>
             <a:r>
-              <a:rPr lang="en-GB" sz="2400" dirty="0" smtClean="0"/>
+              <a:rPr lang="en-GB" sz="2400" dirty="0"/>
+              <a:t>Si </a:t>
+            </a:r>
+            <a:r>
+              <a:rPr lang="en-GB" sz="2400" dirty="0" err="1"/>
+              <a:t>vous</a:t>
+            </a:r>
+            <a:r>
+              <a:rPr lang="en-GB" sz="2400" dirty="0"/>
+              <a:t> </a:t>
+            </a:r>
+            <a:r>
+              <a:rPr lang="en-GB" sz="2400" dirty="0" err="1"/>
+              <a:t>refusez</a:t>
+            </a:r>
+            <a:r>
+              <a:rPr lang="en-GB" sz="2400" dirty="0"/>
+              <a:t>, et que </a:t>
+            </a:r>
+            <a:r>
+              <a:rPr lang="en-GB" sz="2400" dirty="0" err="1"/>
+              <a:t>cet</a:t>
+            </a:r>
+            <a:r>
+              <a:rPr lang="en-GB" sz="2400" dirty="0"/>
+              <a:t> </a:t>
+            </a:r>
+            <a:r>
+              <a:rPr lang="en-GB" sz="2400" dirty="0" err="1"/>
+              <a:t>exercice</a:t>
+            </a:r>
+            <a:r>
+              <a:rPr lang="en-GB" sz="2400" dirty="0"/>
+              <a:t> </a:t>
+            </a:r>
+            <a:r>
+              <a:rPr lang="en-GB" sz="2400" dirty="0" err="1"/>
+              <a:t>est</a:t>
+            </a:r>
+            <a:r>
+              <a:rPr lang="en-GB" sz="2400" dirty="0"/>
+              <a:t> </a:t>
+            </a:r>
+            <a:r>
+              <a:rPr lang="en-GB" sz="2400" dirty="0" err="1"/>
+              <a:t>tiré</a:t>
+            </a:r>
+            <a:r>
+              <a:rPr lang="en-GB" sz="2400" dirty="0"/>
+              <a:t> au sort, </a:t>
+            </a:r>
+            <a:r>
+              <a:rPr lang="en-GB" sz="2400" dirty="0" err="1"/>
+              <a:t>vous</a:t>
+            </a:r>
+            <a:r>
+              <a:rPr lang="en-GB" sz="2400" dirty="0"/>
+              <a:t> ne </a:t>
+            </a:r>
+            <a:r>
+              <a:rPr lang="fr-FR" sz="2400" dirty="0"/>
+              <a:t>recevrez</a:t>
+            </a:r>
+            <a:r>
+              <a:rPr lang="en-GB" sz="2400" dirty="0"/>
+              <a:t> pas le bonus.</a:t>
+            </a:r>
+          </a:p>
+          <a:p>
+            <a:pPr algn="ctr">
+              <a:spcAft>
+                <a:spcPts val="600"/>
+              </a:spcAft>
+            </a:pPr>
+            <a:endParaRPr lang="en-GB" sz="2400" dirty="0"/>
+          </a:p>
+          <a:p>
+            <a:pPr algn="ctr">
+              <a:spcAft>
+                <a:spcPts val="600"/>
+              </a:spcAft>
+            </a:pPr>
+            <a:r>
+              <a:rPr lang="en-GB" sz="2400" dirty="0"/>
               <a:t>Par </a:t>
             </a:r>
             <a:r>
-              <a:rPr lang="en-GB" sz="2400" dirty="0" err="1" smtClean="0"/>
+              <a:rPr lang="en-GB" sz="2400" dirty="0" err="1"/>
               <a:t>ailleurs</a:t>
             </a:r>
             <a:r>
-              <a:rPr lang="en-GB" sz="2400" dirty="0" smtClean="0"/>
+              <a:rPr lang="en-GB" sz="2400" dirty="0"/>
               <a:t>, </a:t>
             </a:r>
             <a:r>
@@ -4433,11 +4281,11 @@
               <a:t> pour </a:t>
             </a:r>
             <a:r>
-              <a:rPr lang="en-GB" sz="2400" dirty="0" err="1" smtClean="0"/>
+              <a:rPr lang="en-GB" sz="2400" dirty="0" err="1"/>
               <a:t>compléter</a:t>
             </a:r>
             <a:r>
-              <a:rPr lang="en-GB" sz="2400" dirty="0" smtClean="0"/>
+              <a:rPr lang="en-GB" sz="2400" dirty="0"/>
               <a:t> </a:t>
             </a:r>
             <a:r>
@@ -4446,17 +4294,16 @@
             </a:r>
             <a:r>
               <a:rPr lang="en-GB" sz="2400" dirty="0"/>
-              <a:t> (90 </a:t>
+              <a:t> (80 </a:t>
             </a:r>
             <a:r>
               <a:rPr lang="fr-FR" sz="2400" dirty="0"/>
               <a:t>secondes</a:t>
             </a:r>
             <a:r>
-              <a:rPr lang="en-GB" sz="2400" dirty="0" smtClean="0"/>
+              <a:rPr lang="en-GB" sz="2400" dirty="0"/>
               <a:t>).</a:t>
             </a:r>
-            <a:endParaRPr lang="en-GB" sz="2400" dirty="0"/>
           </a:p>
         </p:txBody>
       </p:sp>
@@ -4494,18 +4341,13 @@
               </a:spcAft>
             </a:pPr>
             <a:r>
-              <a:rPr lang="en-GB" sz="2400" b="1" dirty="0" smtClean="0">
+              <a:rPr lang="en-GB" sz="2400" b="1" dirty="0">
                 <a:solidFill>
                   <a:srgbClr val="0070C0"/>
                 </a:solidFill>
               </a:rPr>
               <a:t>CHOISISSEZ QUEL EXERCICE VOUS VOULEZ EFFECTUER!</a:t>
             </a:r>
-            <a:endParaRPr lang="en-GB" sz="2400" b="1" dirty="0">
-              <a:solidFill>
-                <a:srgbClr val="0070C0"/>
-              </a:solidFill>
-            </a:endParaRPr>
           </a:p>
         </p:txBody>
       </p:sp>
@@ -4567,8 +4409,8 @@
               </a:spcAft>
             </a:pPr>
             <a:r>
-              <a:rPr lang="fr-FR" sz="2400" dirty="0" smtClean="0"/>
-              <a:t>Chaque exercice dure 90 secondes. </a:t>
+              <a:rPr lang="fr-FR" sz="2400" dirty="0"/>
+              <a:t>Chaque exercice dure 80 secondes. </a:t>
             </a:r>
           </a:p>
           <a:p>
@@ -4578,36 +4420,8 @@
               </a:spcAft>
             </a:pPr>
             <a:r>
-              <a:rPr lang="fr-FR" sz="2400" dirty="0" smtClean="0"/>
-              <a:t>Si </a:t>
-            </a:r>
-            <a:r>
               <a:rPr lang="fr-FR" sz="2400" dirty="0"/>
-              <a:t>l’effort </a:t>
-            </a:r>
-            <a:r>
-              <a:rPr lang="fr-FR" sz="2400" dirty="0" smtClean="0"/>
-              <a:t>qui </a:t>
-            </a:r>
-            <a:r>
-              <a:rPr lang="fr-FR" sz="2400" dirty="0"/>
-              <a:t>vous </a:t>
-            </a:r>
-            <a:r>
-              <a:rPr lang="fr-FR" sz="2400" dirty="0" smtClean="0"/>
-              <a:t>est demandé </a:t>
-            </a:r>
-            <a:r>
-              <a:rPr lang="fr-FR" sz="2400" dirty="0"/>
-              <a:t>est trop important, vous avez la possibilité d’arrêter l’exercice à tout moment, </a:t>
-            </a:r>
-            <a:r>
-              <a:rPr lang="fr-FR" sz="2400" dirty="0" smtClean="0"/>
-              <a:t>en </a:t>
-            </a:r>
-            <a:r>
-              <a:rPr lang="fr-FR" sz="2400" dirty="0"/>
-              <a:t>appuyant sur la touche « Entrée ».</a:t>
+              <a:t>Si l’effort qui vous est demandé est trop important, vous avez la possibilité d’arrêter l’exercice à tout moment, en appuyant sur la touche « Entrée ».</a:t>
             </a:r>
             <a:endParaRPr lang="fr-FR" sz="2400" b="1" dirty="0"/>
           </a:p>
@@ -4728,18 +4542,13 @@
               </a:spcAft>
             </a:pPr>
             <a:r>
-              <a:rPr lang="en-GB" sz="2400" b="1" dirty="0" smtClean="0">
+              <a:rPr lang="en-GB" sz="2400" b="1" dirty="0">
                 <a:solidFill>
                   <a:srgbClr val="0070C0"/>
                 </a:solidFill>
               </a:rPr>
               <a:t>EXERCICE DE CHARGE MENTALE: ABANDON</a:t>
             </a:r>
-            <a:endParaRPr lang="en-GB" sz="2400" b="1" dirty="0">
-              <a:solidFill>
-                <a:srgbClr val="0070C0"/>
-              </a:solidFill>
-            </a:endParaRPr>
           </a:p>
         </p:txBody>
       </p:sp>
@@ -4770,27 +4579,27 @@
               </a:spcAft>
             </a:pPr>
             <a:r>
-              <a:rPr lang="en-GB" sz="2400" dirty="0" err="1" smtClean="0"/>
+              <a:rPr lang="en-GB" sz="2400" dirty="0" err="1"/>
               <a:t>Vous</a:t>
             </a:r>
             <a:r>
-              <a:rPr lang="en-GB" sz="2400" dirty="0" smtClean="0"/>
+              <a:rPr lang="en-GB" sz="2400" dirty="0"/>
               <a:t> </a:t>
             </a:r>
             <a:r>
-              <a:rPr lang="en-GB" sz="2400" dirty="0" err="1" smtClean="0"/>
+              <a:rPr lang="en-GB" sz="2400" dirty="0" err="1"/>
               <a:t>pourrez</a:t>
             </a:r>
             <a:r>
-              <a:rPr lang="en-GB" sz="2400" dirty="0" smtClean="0"/>
+              <a:rPr lang="en-GB" sz="2400" dirty="0"/>
               <a:t> </a:t>
             </a:r>
             <a:r>
-              <a:rPr lang="en-GB" sz="2400" dirty="0" err="1" smtClean="0"/>
+              <a:rPr lang="en-GB" sz="2400" dirty="0" err="1"/>
               <a:t>alors</a:t>
             </a:r>
             <a:r>
-              <a:rPr lang="en-GB" sz="2400" dirty="0" smtClean="0"/>
+              <a:rPr lang="en-GB" sz="2400" dirty="0"/>
               <a:t> </a:t>
             </a:r>
             <a:r>
@@ -4834,19 +4643,19 @@
               <a:t> pour </a:t>
             </a:r>
             <a:r>
-              <a:rPr lang="en-GB" sz="2400" dirty="0" err="1" smtClean="0"/>
+              <a:rPr lang="en-GB" sz="2400" dirty="0" err="1"/>
               <a:t>compléter</a:t>
             </a:r>
             <a:r>
-              <a:rPr lang="en-GB" sz="2400" dirty="0" smtClean="0"/>
+              <a:rPr lang="en-GB" sz="2400" dirty="0"/>
               <a:t> </a:t>
             </a:r>
             <a:r>
-              <a:rPr lang="en-GB" sz="2400" dirty="0" err="1" smtClean="0"/>
+              <a:rPr lang="en-GB" sz="2400" dirty="0" err="1"/>
               <a:t>l’exercice</a:t>
             </a:r>
             <a:r>
-              <a:rPr lang="fr-FR" sz="2400" dirty="0" smtClean="0"/>
+              <a:rPr lang="fr-FR" sz="2400" dirty="0"/>
               <a:t>.</a:t>
             </a:r>
             <a:endParaRPr lang="en-GB" sz="2400" dirty="0"/>
@@ -4912,13 +4721,8 @@
             </a:pPr>
             <a:r>
               <a:rPr lang="fr-FR" sz="2400" dirty="0"/>
-              <a:t>En plus, nous vous demanderons deux fois au cours d’un exercice si vous souhaitez </a:t>
-            </a:r>
-            <a:r>
-              <a:rPr lang="fr-FR" sz="2400" dirty="0" smtClean="0"/>
-              <a:t>l'arrêter:</a:t>
-            </a:r>
-            <a:endParaRPr lang="fr-FR" sz="2400" dirty="0"/>
+              <a:t>En plus, nous vous demanderons deux fois au cours d’un exercice si vous souhaitez l'arrêter:</a:t>
+            </a:r>
           </a:p>
         </p:txBody>
       </p:sp>
@@ -5037,18 +4841,13 @@
               </a:spcAft>
             </a:pPr>
             <a:r>
-              <a:rPr lang="en-GB" sz="2400" b="1" dirty="0" smtClean="0">
+              <a:rPr lang="en-GB" sz="2400" b="1" dirty="0">
                 <a:solidFill>
                   <a:srgbClr val="0070C0"/>
                 </a:solidFill>
               </a:rPr>
               <a:t>EXERCICE DE CHARGE MENTALE: ABANDON</a:t>
             </a:r>
-            <a:endParaRPr lang="en-GB" sz="2400" b="1" dirty="0">
-              <a:solidFill>
-                <a:srgbClr val="0070C0"/>
-              </a:solidFill>
-            </a:endParaRPr>
           </a:p>
         </p:txBody>
       </p:sp>
@@ -5079,43 +4878,43 @@
               </a:spcAft>
             </a:pPr>
             <a:r>
-              <a:rPr lang="en-GB" sz="2400" dirty="0" err="1" smtClean="0"/>
+              <a:rPr lang="en-GB" sz="2400" dirty="0" err="1"/>
               <a:t>Ici</a:t>
             </a:r>
             <a:r>
-              <a:rPr lang="en-GB" sz="2400" dirty="0" smtClean="0"/>
+              <a:rPr lang="en-GB" sz="2400" dirty="0"/>
               <a:t> </a:t>
             </a:r>
             <a:r>
-              <a:rPr lang="en-GB" sz="2400" dirty="0" err="1" smtClean="0"/>
+              <a:rPr lang="en-GB" sz="2400" dirty="0" err="1"/>
               <a:t>aussi</a:t>
             </a:r>
             <a:r>
-              <a:rPr lang="en-GB" sz="2400" dirty="0" smtClean="0"/>
+              <a:rPr lang="en-GB" sz="2400" dirty="0"/>
               <a:t>, </a:t>
             </a:r>
             <a:r>
-              <a:rPr lang="en-GB" sz="2400" dirty="0" err="1" smtClean="0"/>
+              <a:rPr lang="en-GB" sz="2400" dirty="0" err="1"/>
               <a:t>vous</a:t>
             </a:r>
             <a:r>
-              <a:rPr lang="en-GB" sz="2400" dirty="0" smtClean="0"/>
+              <a:rPr lang="en-GB" sz="2400" dirty="0"/>
               <a:t> </a:t>
             </a:r>
             <a:r>
-              <a:rPr lang="en-GB" sz="2400" dirty="0" err="1" smtClean="0"/>
+              <a:rPr lang="en-GB" sz="2400" dirty="0" err="1"/>
               <a:t>pourrez</a:t>
             </a:r>
             <a:r>
-              <a:rPr lang="en-GB" sz="2400" dirty="0" smtClean="0"/>
+              <a:rPr lang="en-GB" sz="2400" dirty="0"/>
               <a:t> </a:t>
             </a:r>
             <a:r>
-              <a:rPr lang="en-GB" sz="2400" dirty="0" err="1" smtClean="0"/>
+              <a:rPr lang="en-GB" sz="2400" dirty="0" err="1"/>
               <a:t>alors</a:t>
             </a:r>
             <a:r>
-              <a:rPr lang="en-GB" sz="2400" dirty="0" smtClean="0"/>
+              <a:rPr lang="en-GB" sz="2400" dirty="0"/>
               <a:t> </a:t>
             </a:r>
             <a:r>
@@ -5159,19 +4958,19 @@
               <a:t> pour </a:t>
             </a:r>
             <a:r>
-              <a:rPr lang="en-GB" sz="2400" dirty="0" err="1" smtClean="0"/>
+              <a:rPr lang="en-GB" sz="2400" dirty="0" err="1"/>
               <a:t>compléter</a:t>
             </a:r>
             <a:r>
-              <a:rPr lang="en-GB" sz="2400" dirty="0" smtClean="0"/>
+              <a:rPr lang="en-GB" sz="2400" dirty="0"/>
               <a:t> </a:t>
             </a:r>
             <a:r>
-              <a:rPr lang="en-GB" sz="2400" dirty="0" err="1" smtClean="0"/>
+              <a:rPr lang="en-GB" sz="2400" dirty="0" err="1"/>
               <a:t>l’exercice</a:t>
             </a:r>
             <a:r>
-              <a:rPr lang="fr-FR" sz="2400" dirty="0" smtClean="0"/>
+              <a:rPr lang="fr-FR" sz="2400" dirty="0"/>
               <a:t>.</a:t>
             </a:r>
           </a:p>
@@ -5238,14 +5037,13 @@
               <a:t>s 4 </a:t>
             </a:r>
             <a:r>
-              <a:rPr lang="en-GB" sz="2400" dirty="0" err="1" smtClean="0"/>
+              <a:rPr lang="en-GB" sz="2400" dirty="0" err="1"/>
               <a:t>secondes</a:t>
             </a:r>
             <a:r>
-              <a:rPr lang="en-GB" sz="2400" dirty="0" smtClean="0"/>
+              <a:rPr lang="en-GB" sz="2400" dirty="0"/>
               <a:t>.</a:t>
             </a:r>
-            <a:endParaRPr lang="en-GB" sz="2400" dirty="0"/>
           </a:p>
         </p:txBody>
       </p:sp>
@@ -5347,137 +5145,9 @@
           <a:p>
             <a:pPr algn="ctr"/>
             <a:r>
-              <a:rPr lang="en-GB" sz="2400" dirty="0" smtClean="0"/>
-              <a:t>Au total, le test </a:t>
-            </a:r>
-            <a:r>
-              <a:rPr lang="en-GB" sz="2400" dirty="0" err="1" smtClean="0"/>
-              <a:t>comprend</a:t>
-            </a:r>
-            <a:r>
-              <a:rPr lang="en-GB" sz="2400" dirty="0" smtClean="0"/>
-              <a:t> </a:t>
-            </a:r>
-            <a:r>
-              <a:rPr lang="en-GB" sz="2400" dirty="0" smtClean="0"/>
-              <a:t>32 </a:t>
-            </a:r>
-            <a:r>
-              <a:rPr lang="en-GB" sz="2400" dirty="0" err="1" smtClean="0"/>
-              <a:t>exercices</a:t>
-            </a:r>
-            <a:r>
-              <a:rPr lang="en-GB" sz="2400" dirty="0" smtClean="0"/>
-              <a:t> de charge </a:t>
-            </a:r>
-            <a:r>
-              <a:rPr lang="en-GB" sz="2400" dirty="0" err="1" smtClean="0"/>
-              <a:t>mentale</a:t>
-            </a:r>
-            <a:r>
-              <a:rPr lang="en-GB" sz="2400" dirty="0" smtClean="0"/>
-              <a:t>, qui </a:t>
-            </a:r>
-            <a:r>
-              <a:rPr lang="en-GB" sz="2400" dirty="0" err="1" smtClean="0"/>
-              <a:t>dure</a:t>
-            </a:r>
-            <a:r>
-              <a:rPr lang="en-GB" sz="2400" dirty="0" smtClean="0"/>
-              <a:t> </a:t>
-            </a:r>
-            <a:r>
-              <a:rPr lang="en-GB" sz="2400" dirty="0" err="1" smtClean="0"/>
-              <a:t>chacun</a:t>
-            </a:r>
-            <a:r>
-              <a:rPr lang="en-GB" sz="2400" dirty="0" smtClean="0"/>
-              <a:t> 90 </a:t>
-            </a:r>
-            <a:r>
-              <a:rPr lang="en-GB" sz="2400" dirty="0" err="1" smtClean="0"/>
-              <a:t>secondes</a:t>
-            </a:r>
-            <a:r>
-              <a:rPr lang="en-GB" sz="2400" dirty="0" smtClean="0"/>
-              <a:t>.</a:t>
-            </a:r>
-          </a:p>
-          <a:p>
-            <a:pPr algn="ctr"/>
-            <a:endParaRPr lang="en-GB" sz="2400" dirty="0" smtClean="0"/>
-          </a:p>
-          <a:p>
-            <a:pPr algn="ctr"/>
-            <a:r>
-              <a:rPr lang="en-GB" sz="2400" dirty="0" smtClean="0"/>
-              <a:t>Pour </a:t>
-            </a:r>
-            <a:r>
-              <a:rPr lang="en-GB" sz="2400" dirty="0" err="1" smtClean="0"/>
-              <a:t>obtenir</a:t>
-            </a:r>
-            <a:r>
-              <a:rPr lang="en-GB" sz="2400" dirty="0" smtClean="0"/>
-              <a:t> le bonus, </a:t>
-            </a:r>
-            <a:r>
-              <a:rPr lang="en-GB" sz="2400" dirty="0" err="1" smtClean="0"/>
-              <a:t>vous</a:t>
-            </a:r>
-            <a:r>
-              <a:rPr lang="en-GB" sz="2400" dirty="0" smtClean="0"/>
-              <a:t> </a:t>
-            </a:r>
-            <a:r>
-              <a:rPr lang="en-GB" sz="2400" dirty="0" err="1" smtClean="0"/>
-              <a:t>devez</a:t>
-            </a:r>
-            <a:r>
-              <a:rPr lang="en-GB" sz="2400" dirty="0" smtClean="0"/>
-              <a:t> </a:t>
-            </a:r>
-            <a:r>
-              <a:rPr lang="en-GB" sz="2400" dirty="0" err="1" smtClean="0"/>
-              <a:t>avoir</a:t>
-            </a:r>
-            <a:r>
-              <a:rPr lang="en-GB" sz="2400" dirty="0" smtClean="0"/>
-              <a:t> </a:t>
-            </a:r>
-            <a:r>
-              <a:rPr lang="en-GB" sz="2400" dirty="0" err="1" smtClean="0"/>
-              <a:t>une</a:t>
-            </a:r>
-            <a:r>
-              <a:rPr lang="en-GB" sz="2400" dirty="0" smtClean="0"/>
-              <a:t> performance </a:t>
-            </a:r>
-            <a:r>
-              <a:rPr lang="en-GB" sz="2400" dirty="0" err="1" smtClean="0"/>
-              <a:t>adéquate</a:t>
-            </a:r>
-            <a:r>
-              <a:rPr lang="en-GB" sz="2400" dirty="0" smtClean="0"/>
-              <a:t> sur </a:t>
-            </a:r>
-            <a:r>
-              <a:rPr lang="en-GB" sz="2400" dirty="0" err="1" smtClean="0"/>
-              <a:t>l’exercice</a:t>
-            </a:r>
-            <a:r>
-              <a:rPr lang="en-GB" sz="2400" dirty="0" smtClean="0"/>
-              <a:t> </a:t>
-            </a:r>
-            <a:r>
-              <a:rPr lang="en-GB" sz="2400" dirty="0" err="1" smtClean="0"/>
-              <a:t>tiré</a:t>
-            </a:r>
-            <a:r>
-              <a:rPr lang="en-GB" sz="2400" dirty="0" smtClean="0"/>
-              <a:t> au sort. </a:t>
-            </a:r>
-            <a:endParaRPr lang="en-GB" sz="2400" dirty="0" smtClean="0"/>
+              <a:rPr lang="fr-FR" sz="2400" dirty="0"/>
+              <a:t>Au total, le test comprend 32 exercices de charge mentale, qui dure chacun 80 secondes.</a:t>
+            </a:r>
           </a:p>
           <a:p>
             <a:pPr algn="ctr"/>
@@ -5486,10 +5156,21 @@
           <a:p>
             <a:pPr algn="ctr"/>
             <a:r>
-              <a:rPr lang="fr-FR" sz="2400" dirty="0" smtClean="0"/>
-              <a:t>Vous avez le choix de ne pas effectuer certains des exercices que nous vous proposons. Vous pouvez aussi abandonner un exercice en cours de route. Dans les deux cas, vous prenez le risque de ne pas obtenir le bonus financier.</a:t>
-            </a:r>
-            <a:endParaRPr lang="en-GB" sz="2400" dirty="0" smtClean="0"/>
+              <a:rPr lang="fr-FR" sz="2400" dirty="0"/>
+              <a:t>Pour obtenir le bonus, vous devez avoir une performance adéquate sur les deux exercices</a:t>
+            </a:r>
+            <a:r>
+              <a:rPr lang="en-GB" sz="2400" dirty="0"/>
+              <a:t> </a:t>
+            </a:r>
+            <a:r>
+              <a:rPr lang="fr-FR" sz="2400" dirty="0"/>
+              <a:t>tirés</a:t>
+            </a:r>
+            <a:r>
+              <a:rPr lang="en-GB" sz="2400" dirty="0"/>
+              <a:t> au sort.</a:t>
+            </a:r>
           </a:p>
           <a:p>
             <a:pPr algn="ctr"/>
@@ -5498,109 +5179,32 @@
           <a:p>
             <a:pPr algn="ctr"/>
             <a:r>
-              <a:rPr lang="en-GB" sz="2400" dirty="0" err="1" smtClean="0"/>
-              <a:t>Relisez</a:t>
-            </a:r>
-            <a:r>
-              <a:rPr lang="en-GB" sz="2400" dirty="0" smtClean="0"/>
-              <a:t> </a:t>
-            </a:r>
-            <a:r>
-              <a:rPr lang="en-GB" sz="2400" dirty="0" err="1" smtClean="0"/>
-              <a:t>ces</a:t>
-            </a:r>
-            <a:r>
-              <a:rPr lang="en-GB" sz="2400" dirty="0" smtClean="0"/>
-              <a:t> instructions </a:t>
-            </a:r>
-            <a:r>
-              <a:rPr lang="en-GB" sz="2400" dirty="0" err="1" smtClean="0"/>
-              <a:t>jusqu’à</a:t>
-            </a:r>
-            <a:r>
-              <a:rPr lang="en-GB" sz="2400" dirty="0" smtClean="0"/>
-              <a:t> </a:t>
-            </a:r>
-            <a:r>
-              <a:rPr lang="en-GB" sz="2400" dirty="0" err="1" smtClean="0"/>
-              <a:t>ce</a:t>
-            </a:r>
-            <a:r>
-              <a:rPr lang="en-GB" sz="2400" dirty="0" smtClean="0"/>
-              <a:t> </a:t>
-            </a:r>
-            <a:r>
-              <a:rPr lang="en-GB" sz="2400" dirty="0" err="1" smtClean="0"/>
-              <a:t>qu’elles</a:t>
-            </a:r>
-            <a:r>
-              <a:rPr lang="en-GB" sz="2400" dirty="0" smtClean="0"/>
-              <a:t> </a:t>
-            </a:r>
-            <a:r>
-              <a:rPr lang="en-GB" sz="2400" dirty="0" err="1" smtClean="0"/>
-              <a:t>soient</a:t>
-            </a:r>
-            <a:r>
-              <a:rPr lang="en-GB" sz="2400" dirty="0" smtClean="0"/>
-              <a:t> </a:t>
-            </a:r>
-            <a:r>
-              <a:rPr lang="en-GB" sz="2400" dirty="0" err="1" smtClean="0"/>
-              <a:t>parfaitement</a:t>
-            </a:r>
-            <a:r>
-              <a:rPr lang="en-GB" sz="2400" dirty="0" smtClean="0"/>
-              <a:t> </a:t>
-            </a:r>
-            <a:r>
-              <a:rPr lang="en-GB" sz="2400" dirty="0" err="1" smtClean="0"/>
-              <a:t>claires</a:t>
-            </a:r>
-            <a:r>
-              <a:rPr lang="en-GB" sz="2400" dirty="0" smtClean="0"/>
-              <a:t>.</a:t>
-            </a:r>
+              <a:rPr lang="fr-FR" sz="2400" dirty="0"/>
+              <a:t>Vous avez le choix de ne pas effectuer certains des exercices que nous vous proposons. Vous pouvez aussi abandonner un exercice en cours de route. Dans les deux cas, vous prenez le risque de ne pas obtenir le bonus financier.</a:t>
+            </a:r>
+            <a:endParaRPr lang="en-GB" sz="2400" dirty="0"/>
           </a:p>
           <a:p>
             <a:pPr algn="ctr"/>
-            <a:endParaRPr lang="en-GB" sz="2400" dirty="0" smtClean="0"/>
+            <a:endParaRPr lang="en-GB" sz="2400" dirty="0"/>
           </a:p>
           <a:p>
             <a:pPr algn="ctr"/>
             <a:r>
-              <a:rPr lang="en-GB" sz="2400" dirty="0" err="1" smtClean="0"/>
-              <a:t>Vous</a:t>
-            </a:r>
-            <a:r>
-              <a:rPr lang="en-GB" sz="2400" dirty="0" smtClean="0"/>
-              <a:t> </a:t>
-            </a:r>
-            <a:r>
-              <a:rPr lang="en-GB" sz="2400" dirty="0" err="1" smtClean="0"/>
-              <a:t>êtes</a:t>
-            </a:r>
-            <a:r>
-              <a:rPr lang="en-GB" sz="2400" dirty="0" smtClean="0"/>
-              <a:t> prêt(e)? </a:t>
-            </a:r>
-            <a:r>
-              <a:rPr lang="en-GB" sz="2400" dirty="0" err="1" smtClean="0"/>
-              <a:t>Passons</a:t>
-            </a:r>
-            <a:r>
-              <a:rPr lang="en-GB" sz="2400" dirty="0" smtClean="0"/>
-              <a:t> à </a:t>
-            </a:r>
-            <a:r>
-              <a:rPr lang="en-GB" sz="2400" dirty="0" err="1" smtClean="0"/>
-              <a:t>l’entraînement</a:t>
-            </a:r>
-            <a:r>
-              <a:rPr lang="en-GB" sz="2400" dirty="0" smtClean="0"/>
-              <a:t>…</a:t>
-            </a:r>
+              <a:rPr lang="fr-FR" sz="2400" dirty="0"/>
+              <a:t>Relisez ces instructions jusqu’à ce qu’elles soient parfaitement claires.</a:t>
+            </a:r>
+          </a:p>
+          <a:p>
+            <a:pPr algn="ctr"/>
             <a:endParaRPr lang="en-GB" sz="2400" dirty="0"/>
+          </a:p>
+          <a:p>
+            <a:pPr algn="ctr"/>
+            <a:r>
+              <a:rPr lang="fr-FR" sz="2400" dirty="0"/>
+              <a:t>Vous êtes prêt(e)? Passons à l’entraînement…</a:t>
+            </a:r>
           </a:p>
         </p:txBody>
       </p:sp>
@@ -5614,13 +5218,6 @@
   <p:clrMapOvr>
     <a:masterClrMapping/>
   </p:clrMapOvr>
-  <p:timing>
-    <p:tnLst>
-      <p:par>
-        <p:cTn id="1" dur="indefinite" restart="never" nodeType="tmRoot"/>
-      </p:par>
-    </p:tnLst>
-  </p:timing>
 </p:sld>
 </file>
 
@@ -5684,10 +5281,6 @@
             </a:r>
           </a:p>
           <a:p>
-            <a:pPr algn="ctr"/>
-            <a:endParaRPr lang="fr-FR" sz="2400" dirty="0"/>
-          </a:p>
-          <a:p>
             <a:pPr marL="0" indent="0" algn="ctr">
               <a:buNone/>
             </a:pPr>
@@ -5701,7 +5294,6 @@
               <a:rPr lang="fr-FR" sz="2400" dirty="0"/>
               <a:t>Votre performance dans cette phase ne sera pas prise en compte pour votre bonus financier. </a:t>
             </a:r>
-            <a:endParaRPr lang="fr-FR" sz="2400" dirty="0" smtClean="0"/>
           </a:p>
           <a:p>
             <a:pPr marL="0" indent="0" algn="ctr">
@@ -5714,14 +5306,9 @@
               <a:buNone/>
             </a:pPr>
             <a:r>
-              <a:rPr lang="fr-FR" sz="2400" dirty="0" smtClean="0"/>
-              <a:t>Attention: durant la phase d’entraînement, vous ne pourrez pas abandonner un exercice </a:t>
-            </a:r>
-            <a:r>
-              <a:rPr lang="fr-FR" sz="2400" smtClean="0"/>
-              <a:t>en cours...</a:t>
-            </a:r>
-            <a:endParaRPr lang="fr-FR" sz="2400" dirty="0"/>
+              <a:rPr lang="fr-FR" sz="2400" dirty="0"/>
+              <a:t>Attention: durant la phase d’entraînement, vous ne pourrez pas abandonner un exercice en cours...</a:t>
+            </a:r>
           </a:p>
           <a:p>
             <a:pPr marL="0" indent="0" algn="ctr">
@@ -5777,18 +5364,13 @@
               </a:spcAft>
             </a:pPr>
             <a:r>
-              <a:rPr lang="en-GB" sz="2400" b="1" dirty="0" smtClean="0">
+              <a:rPr lang="en-GB" sz="2400" b="1" dirty="0">
                 <a:solidFill>
                   <a:srgbClr val="0070C0"/>
                 </a:solidFill>
               </a:rPr>
               <a:t>ENTRAÎNEMENT</a:t>
             </a:r>
-            <a:endParaRPr lang="en-GB" sz="2400" b="1" dirty="0">
-              <a:solidFill>
-                <a:srgbClr val="0070C0"/>
-              </a:solidFill>
-            </a:endParaRPr>
           </a:p>
         </p:txBody>
       </p:sp>
@@ -5866,488 +5448,6 @@
   <p:clrMapOvr>
     <a:masterClrMapping/>
   </p:clrMapOvr>
-  <p:timing>
-    <p:tnLst>
-      <p:par>
-        <p:cTn id="1" dur="indefinite" restart="never" nodeType="tmRoot"/>
-      </p:par>
-    </p:tnLst>
-  </p:timing>
-</p:sld>
-</file>
-
-<file path=ppt/slides/slide16.xml><?xml version="1.0" encoding="utf-8"?>
-<p:sld xmlns:a="http://schemas.openxmlformats.org/drawingml/2006/main" xmlns:r="http://schemas.openxmlformats.org/officeDocument/2006/relationships" xmlns:p="http://schemas.openxmlformats.org/presentationml/2006/main">
-  <p:cSld>
-    <p:spTree>
-      <p:nvGrpSpPr>
-        <p:cNvPr id="1" name=""/>
-        <p:cNvGrpSpPr/>
-        <p:nvPr/>
-      </p:nvGrpSpPr>
-      <p:grpSpPr>
-        <a:xfrm>
-          <a:off x="0" y="0"/>
-          <a:ext cx="0" cy="0"/>
-          <a:chOff x="0" y="0"/>
-          <a:chExt cx="0" cy="0"/>
-        </a:xfrm>
-      </p:grpSpPr>
-      <p:sp>
-        <p:nvSpPr>
-          <p:cNvPr id="5" name="Espace réservé du contenu 4"/>
-          <p:cNvSpPr>
-            <a:spLocks noGrp="1"/>
-          </p:cNvSpPr>
-          <p:nvPr>
-            <p:ph idx="1"/>
-          </p:nvPr>
-        </p:nvSpPr>
-        <p:spPr>
-          <a:xfrm>
-            <a:off x="838200" y="1193722"/>
-            <a:ext cx="10608425" cy="5207077"/>
-          </a:xfrm>
-        </p:spPr>
-        <p:txBody>
-          <a:bodyPr>
-            <a:noAutofit/>
-          </a:bodyPr>
-          <a:lstStyle/>
-          <a:p>
-            <a:pPr marL="0" indent="0" algn="ctr">
-              <a:buNone/>
-            </a:pPr>
-            <a:endParaRPr lang="fr-FR" sz="2400" dirty="0"/>
-          </a:p>
-          <a:p>
-            <a:pPr marL="0" indent="0" algn="ctr">
-              <a:buNone/>
-            </a:pPr>
-            <a:endParaRPr lang="fr-FR" sz="2400" dirty="0"/>
-          </a:p>
-          <a:p>
-            <a:pPr marL="0" indent="0" algn="ctr">
-              <a:buNone/>
-            </a:pPr>
-            <a:r>
-              <a:rPr lang="fr-FR" sz="2400" dirty="0" smtClean="0"/>
-              <a:t>L’entrainement est maintenant terminé. Vous allez maintenant commencer le test. </a:t>
-            </a:r>
-            <a:endParaRPr lang="fr-FR" sz="2400" dirty="0"/>
-          </a:p>
-          <a:p>
-            <a:pPr algn="ctr"/>
-            <a:endParaRPr lang="fr-FR" sz="2400" dirty="0"/>
-          </a:p>
-          <a:p>
-            <a:pPr marL="0" indent="0" algn="ctr">
-              <a:buNone/>
-            </a:pPr>
-            <a:endParaRPr lang="fr-FR" sz="2400" dirty="0"/>
-          </a:p>
-          <a:p>
-            <a:pPr marL="0" indent="0" algn="ctr">
-              <a:buNone/>
-            </a:pPr>
-            <a:r>
-              <a:rPr lang="fr-FR" sz="2400" dirty="0"/>
-              <a:t>Votre performance dans cette phase </a:t>
-            </a:r>
-            <a:r>
-              <a:rPr lang="fr-FR" sz="2400" smtClean="0"/>
-              <a:t>sera prise </a:t>
-            </a:r>
-            <a:r>
-              <a:rPr lang="fr-FR" sz="2400" dirty="0"/>
-              <a:t>en compte pour votre bonus financier. </a:t>
-            </a:r>
-            <a:endParaRPr lang="fr-FR" sz="2400" dirty="0" smtClean="0"/>
-          </a:p>
-          <a:p>
-            <a:pPr marL="0" indent="0" algn="ctr">
-              <a:buNone/>
-            </a:pPr>
-            <a:endParaRPr lang="fr-FR" sz="2400" dirty="0"/>
-          </a:p>
-          <a:p>
-            <a:pPr marL="0" indent="0" algn="ctr">
-              <a:buNone/>
-            </a:pPr>
-            <a:r>
-              <a:rPr lang="fr-FR" sz="2400" dirty="0" smtClean="0"/>
-              <a:t>Vous êtes prêt(e)?</a:t>
-            </a:r>
-            <a:endParaRPr lang="fr-FR" sz="2400" dirty="0"/>
-          </a:p>
-          <a:p>
-            <a:pPr marL="0" indent="0" algn="ctr">
-              <a:buNone/>
-            </a:pPr>
-            <a:endParaRPr lang="fr-FR" sz="2400" dirty="0"/>
-          </a:p>
-          <a:p>
-            <a:pPr marL="0" indent="0" algn="ctr">
-              <a:buNone/>
-            </a:pPr>
-            <a:endParaRPr lang="fr-FR" sz="2400" dirty="0"/>
-          </a:p>
-          <a:p>
-            <a:pPr marL="0" indent="0" algn="ctr">
-              <a:buNone/>
-            </a:pPr>
-            <a:endParaRPr lang="fr-FR" sz="2400" dirty="0"/>
-          </a:p>
-        </p:txBody>
-      </p:sp>
-      <p:sp>
-        <p:nvSpPr>
-          <p:cNvPr id="6" name="ZoneTexte 5"/>
-          <p:cNvSpPr txBox="1"/>
-          <p:nvPr/>
-        </p:nvSpPr>
-        <p:spPr>
-          <a:xfrm>
-            <a:off x="3299878" y="379385"/>
-            <a:ext cx="5592244" cy="461665"/>
-          </a:xfrm>
-          <a:prstGeom prst="rect">
-            <a:avLst/>
-          </a:prstGeom>
-          <a:noFill/>
-          <a:ln>
-            <a:noFill/>
-          </a:ln>
-        </p:spPr>
-        <p:txBody>
-          <a:bodyPr wrap="square" rtlCol="0" anchor="ctr">
-            <a:spAutoFit/>
-          </a:bodyPr>
-          <a:lstStyle/>
-          <a:p>
-            <a:pPr algn="ctr">
-              <a:spcBef>
-                <a:spcPts val="1800"/>
-              </a:spcBef>
-              <a:spcAft>
-                <a:spcPts val="1800"/>
-              </a:spcAft>
-            </a:pPr>
-            <a:r>
-              <a:rPr lang="en-GB" sz="2400" b="1" dirty="0" smtClean="0">
-                <a:solidFill>
-                  <a:srgbClr val="0070C0"/>
-                </a:solidFill>
-              </a:rPr>
-              <a:t>FIN DE L’ENTRAÎNEMENT</a:t>
-            </a:r>
-            <a:endParaRPr lang="en-GB" sz="2400" b="1" dirty="0">
-              <a:solidFill>
-                <a:srgbClr val="0070C0"/>
-              </a:solidFill>
-            </a:endParaRPr>
-          </a:p>
-        </p:txBody>
-      </p:sp>
-      <p:sp>
-        <p:nvSpPr>
-          <p:cNvPr id="4" name="Rectangle 3">
-            <a:extLst>
-              <a:ext uri="{FF2B5EF4-FFF2-40B4-BE49-F238E27FC236}">
-                <a16:creationId xmlns:a16="http://schemas.microsoft.com/office/drawing/2014/main" id="{8D4A4AC5-717D-F343-BCBE-5E4E31179B80}"/>
-              </a:ext>
-            </a:extLst>
-          </p:cNvPr>
-          <p:cNvSpPr/>
-          <p:nvPr/>
-        </p:nvSpPr>
-        <p:spPr>
-          <a:xfrm>
-            <a:off x="3551393" y="6176963"/>
-            <a:ext cx="5089214" cy="400110"/>
-          </a:xfrm>
-          <a:prstGeom prst="rect">
-            <a:avLst/>
-          </a:prstGeom>
-        </p:spPr>
-        <p:txBody>
-          <a:bodyPr wrap="none">
-            <a:spAutoFit/>
-          </a:bodyPr>
-          <a:lstStyle/>
-          <a:p>
-            <a:r>
-              <a:rPr lang="fr-FR" sz="2000" i="1" dirty="0">
-                <a:solidFill>
-                  <a:schemeClr val="tx1">
-                    <a:lumMod val="50000"/>
-                    <a:lumOff val="50000"/>
-                  </a:schemeClr>
-                </a:solidFill>
-              </a:rPr>
-              <a:t>Appuyez sur la flèche droite [</a:t>
-            </a:r>
-            <a:r>
-              <a:rPr lang="fr-FR" sz="2000" i="1" dirty="0">
-                <a:solidFill>
-                  <a:schemeClr val="tx1">
-                    <a:lumMod val="50000"/>
-                    <a:lumOff val="50000"/>
-                  </a:schemeClr>
-                </a:solidFill>
-                <a:sym typeface="Wingdings" pitchFamily="2" charset="2"/>
-              </a:rPr>
-              <a:t></a:t>
-            </a:r>
-            <a:r>
-              <a:rPr lang="fr-FR" sz="2000" i="1" dirty="0">
-                <a:solidFill>
-                  <a:schemeClr val="tx1">
-                    <a:lumMod val="50000"/>
-                    <a:lumOff val="50000"/>
-                  </a:schemeClr>
-                </a:solidFill>
-              </a:rPr>
-              <a:t>] pour continuer</a:t>
-            </a:r>
-          </a:p>
-        </p:txBody>
-      </p:sp>
-    </p:spTree>
-    <p:extLst>
-      <p:ext uri="{BB962C8B-B14F-4D97-AF65-F5344CB8AC3E}">
-        <p14:creationId xmlns:p14="http://schemas.microsoft.com/office/powerpoint/2010/main" val="1683065177"/>
-      </p:ext>
-    </p:extLst>
-  </p:cSld>
-  <p:clrMapOvr>
-    <a:masterClrMapping/>
-  </p:clrMapOvr>
-  <p:timing>
-    <p:tnLst>
-      <p:par>
-        <p:cTn id="1" dur="indefinite" restart="never" nodeType="tmRoot"/>
-      </p:par>
-    </p:tnLst>
-  </p:timing>
-</p:sld>
-</file>
-
-<file path=ppt/slides/slide17.xml><?xml version="1.0" encoding="utf-8"?>
-<p:sld xmlns:a="http://schemas.openxmlformats.org/drawingml/2006/main" xmlns:r="http://schemas.openxmlformats.org/officeDocument/2006/relationships" xmlns:p="http://schemas.openxmlformats.org/presentationml/2006/main">
-  <p:cSld>
-    <p:spTree>
-      <p:nvGrpSpPr>
-        <p:cNvPr id="1" name=""/>
-        <p:cNvGrpSpPr/>
-        <p:nvPr/>
-      </p:nvGrpSpPr>
-      <p:grpSpPr>
-        <a:xfrm>
-          <a:off x="0" y="0"/>
-          <a:ext cx="0" cy="0"/>
-          <a:chOff x="0" y="0"/>
-          <a:chExt cx="0" cy="0"/>
-        </a:xfrm>
-      </p:grpSpPr>
-      <p:sp>
-        <p:nvSpPr>
-          <p:cNvPr id="2" name="Titre 1"/>
-          <p:cNvSpPr>
-            <a:spLocks noGrp="1"/>
-          </p:cNvSpPr>
-          <p:nvPr>
-            <p:ph type="title"/>
-          </p:nvPr>
-        </p:nvSpPr>
-        <p:spPr>
-          <a:xfrm>
-            <a:off x="1879774" y="2364012"/>
-            <a:ext cx="8432453" cy="2129977"/>
-          </a:xfrm>
-        </p:spPr>
-        <p:txBody>
-          <a:bodyPr>
-            <a:normAutofit/>
-          </a:bodyPr>
-          <a:lstStyle/>
-          <a:p>
-            <a:pPr algn="ctr"/>
-            <a:r>
-              <a:rPr lang="fr-FR" sz="2400" dirty="0" smtClean="0"/>
-              <a:t>Le test </a:t>
-            </a:r>
-            <a:r>
-              <a:rPr lang="fr-FR" sz="2400" dirty="0" smtClean="0"/>
-              <a:t>de charge mentale </a:t>
-            </a:r>
-            <a:r>
-              <a:rPr lang="fr-FR" sz="2400" dirty="0"/>
-              <a:t>est maintenant </a:t>
-            </a:r>
-            <a:r>
-              <a:rPr lang="fr-FR" sz="2400" dirty="0" smtClean="0"/>
-              <a:t>terminé.</a:t>
-            </a:r>
-            <a:r>
-              <a:rPr lang="fr-FR" sz="2400" dirty="0"/>
-              <a:t/>
-            </a:r>
-            <a:br>
-              <a:rPr lang="fr-FR" sz="2400" dirty="0"/>
-            </a:br>
-            <a:r>
-              <a:rPr lang="fr-FR" sz="2400" dirty="0"/>
-              <a:t> </a:t>
-            </a:r>
-            <a:br>
-              <a:rPr lang="fr-FR" sz="2400" dirty="0"/>
-            </a:br>
-            <a:r>
-              <a:rPr lang="fr-FR" sz="2400" dirty="0"/>
-              <a:t>Merci !</a:t>
-            </a:r>
-          </a:p>
-        </p:txBody>
-      </p:sp>
-      <p:sp>
-        <p:nvSpPr>
-          <p:cNvPr id="5" name="ZoneTexte 4"/>
-          <p:cNvSpPr txBox="1"/>
-          <p:nvPr/>
-        </p:nvSpPr>
-        <p:spPr>
-          <a:xfrm>
-            <a:off x="3428927" y="349649"/>
-            <a:ext cx="5334146" cy="461665"/>
-          </a:xfrm>
-          <a:prstGeom prst="rect">
-            <a:avLst/>
-          </a:prstGeom>
-          <a:noFill/>
-          <a:ln>
-            <a:noFill/>
-          </a:ln>
-        </p:spPr>
-        <p:txBody>
-          <a:bodyPr wrap="square" rtlCol="0" anchor="ctr">
-            <a:spAutoFit/>
-          </a:bodyPr>
-          <a:lstStyle/>
-          <a:p>
-            <a:pPr algn="ctr">
-              <a:spcBef>
-                <a:spcPts val="1800"/>
-              </a:spcBef>
-              <a:spcAft>
-                <a:spcPts val="1800"/>
-              </a:spcAft>
-            </a:pPr>
-            <a:r>
-              <a:rPr lang="en-GB" sz="2400" b="1" dirty="0" smtClean="0">
-                <a:solidFill>
-                  <a:srgbClr val="0070C0"/>
-                </a:solidFill>
-              </a:rPr>
-              <a:t>FIN DU TEST </a:t>
-            </a:r>
-            <a:r>
-              <a:rPr lang="en-GB" sz="2400" b="1" dirty="0" smtClean="0">
-                <a:solidFill>
-                  <a:srgbClr val="0070C0"/>
-                </a:solidFill>
-              </a:rPr>
-              <a:t>DE CHARGE MENTALE</a:t>
-            </a:r>
-            <a:endParaRPr lang="en-GB" sz="2400" b="1" dirty="0">
-              <a:solidFill>
-                <a:srgbClr val="0070C0"/>
-              </a:solidFill>
-            </a:endParaRPr>
-          </a:p>
-        </p:txBody>
-      </p:sp>
-      <p:sp>
-        <p:nvSpPr>
-          <p:cNvPr id="6" name="Rectangle 3">
-            <a:extLst>
-              <a:ext uri="{FF2B5EF4-FFF2-40B4-BE49-F238E27FC236}">
-                <a16:creationId xmlns:a16="http://schemas.microsoft.com/office/drawing/2014/main" id="{96E0DEE1-FC76-AB42-A24F-D4D41E2BA40D}"/>
-              </a:ext>
-            </a:extLst>
-          </p:cNvPr>
-          <p:cNvSpPr/>
-          <p:nvPr/>
-        </p:nvSpPr>
-        <p:spPr>
-          <a:xfrm>
-            <a:off x="3856192" y="6233684"/>
-            <a:ext cx="4521559" cy="400110"/>
-          </a:xfrm>
-          <a:prstGeom prst="rect">
-            <a:avLst/>
-          </a:prstGeom>
-        </p:spPr>
-        <p:txBody>
-          <a:bodyPr wrap="none">
-            <a:spAutoFit/>
-          </a:bodyPr>
-          <a:lstStyle/>
-          <a:p>
-            <a:r>
-              <a:rPr lang="fr-FR" sz="2000" i="1" dirty="0">
-                <a:solidFill>
-                  <a:schemeClr val="tx1">
-                    <a:lumMod val="50000"/>
-                    <a:lumOff val="50000"/>
-                  </a:schemeClr>
-                </a:solidFill>
-              </a:rPr>
-              <a:t>Appuyez sur la flèche droite [</a:t>
-            </a:r>
-            <a:r>
-              <a:rPr lang="fr-FR" sz="2000" i="1" dirty="0">
-                <a:solidFill>
-                  <a:schemeClr val="tx1">
-                    <a:lumMod val="50000"/>
-                    <a:lumOff val="50000"/>
-                  </a:schemeClr>
-                </a:solidFill>
-                <a:sym typeface="Wingdings" pitchFamily="2" charset="2"/>
-              </a:rPr>
-              <a:t></a:t>
-            </a:r>
-            <a:r>
-              <a:rPr lang="fr-FR" sz="2000" i="1" dirty="0">
-                <a:solidFill>
-                  <a:schemeClr val="tx1">
-                    <a:lumMod val="50000"/>
-                    <a:lumOff val="50000"/>
-                  </a:schemeClr>
-                </a:solidFill>
-              </a:rPr>
-              <a:t>] pour finir</a:t>
-            </a:r>
-          </a:p>
-        </p:txBody>
-      </p:sp>
-    </p:spTree>
-    <p:extLst>
-      <p:ext uri="{BB962C8B-B14F-4D97-AF65-F5344CB8AC3E}">
-        <p14:creationId xmlns:p14="http://schemas.microsoft.com/office/powerpoint/2010/main" val="2364762079"/>
-      </p:ext>
-    </p:extLst>
-  </p:cSld>
-  <p:clrMapOvr>
-    <a:masterClrMapping/>
-  </p:clrMapOvr>
-  <p:timing>
-    <p:tnLst>
-      <p:par>
-        <p:cTn id="1" dur="indefinite" restart="never" nodeType="tmRoot"/>
-      </p:par>
-    </p:tnLst>
-  </p:timing>
 </p:sld>
 </file>
 
@@ -6394,44 +5494,8 @@
               <a:buNone/>
             </a:pPr>
             <a:r>
-              <a:rPr lang="fr-FR" sz="2400" dirty="0" smtClean="0"/>
-              <a:t>Ce test </a:t>
-            </a:r>
-            <a:r>
               <a:rPr lang="fr-FR" sz="2400" dirty="0"/>
-              <a:t>dure environ </a:t>
-            </a:r>
-            <a:r>
-              <a:rPr lang="fr-FR" sz="2400" dirty="0" smtClean="0"/>
-              <a:t>30 minutes. </a:t>
-            </a:r>
-            <a:endParaRPr lang="fr-FR" sz="2400" dirty="0"/>
-          </a:p>
-          <a:p>
-            <a:pPr marL="0" indent="0" algn="ctr">
-              <a:buNone/>
-            </a:pPr>
-            <a:endParaRPr lang="fr-FR" sz="2400" dirty="0" smtClean="0"/>
-          </a:p>
-          <a:p>
-            <a:pPr marL="0" indent="0" algn="ctr">
-              <a:buNone/>
-            </a:pPr>
-            <a:r>
-              <a:rPr lang="fr-FR" sz="2400" dirty="0"/>
-              <a:t>Nous allons vous proposer d’effectuer une série d’exercices </a:t>
-            </a:r>
-            <a:r>
-              <a:rPr lang="fr-FR" sz="2400" dirty="0" smtClean="0"/>
-              <a:t>de charge mentale plus </a:t>
-            </a:r>
-            <a:r>
-              <a:rPr lang="fr-FR" sz="2400" dirty="0"/>
-              <a:t>ou moins difficiles. Si vous acceptez d’effectuer ces exercices, et si vous les réussissez, vous recevrez un bonus financier</a:t>
-            </a:r>
-            <a:r>
-              <a:rPr lang="fr-FR" sz="2400" dirty="0" smtClean="0"/>
-              <a:t>.</a:t>
+              <a:t>Ce test dure environ 45 minutes. </a:t>
             </a:r>
           </a:p>
           <a:p>
@@ -6446,47 +5510,37 @@
             </a:pPr>
             <a:r>
               <a:rPr lang="fr-FR" sz="2400" dirty="0"/>
-              <a:t>Si vous pensez que la difficulté d’un exercice est trop importante (en comparaison </a:t>
-            </a:r>
-            <a:r>
-              <a:rPr lang="fr-FR" sz="2400" dirty="0" smtClean="0"/>
-              <a:t>du bonus), </a:t>
-            </a:r>
-            <a:r>
-              <a:rPr lang="fr-FR" sz="2400" dirty="0"/>
-              <a:t>vous pouvez refuser </a:t>
-            </a:r>
-            <a:r>
-              <a:rPr lang="fr-FR" sz="2400" dirty="0" smtClean="0"/>
-              <a:t>de l’effectuer. </a:t>
-            </a:r>
-            <a:r>
-              <a:rPr lang="fr-FR" sz="2400" dirty="0"/>
-              <a:t>Vous avez aussi la possibilité de changer d’avis et de décider d’abandonner l’exercice en cours de route</a:t>
-            </a:r>
-            <a:r>
-              <a:rPr lang="fr-FR" sz="2400" dirty="0" smtClean="0"/>
-              <a:t>.</a:t>
-            </a:r>
-            <a:endParaRPr lang="fr-FR" sz="2400" dirty="0"/>
+              <a:t>Nous allons vous proposer d’effectuer une série d’exercices de charge mentale plus ou moins difficiles. Si vous acceptez d’effectuer ces exercices, et si vous les réussissez, vous recevrez un bonus financier.</a:t>
+            </a:r>
           </a:p>
           <a:p>
             <a:pPr marL="0" indent="0" algn="ctr">
               <a:buNone/>
             </a:pPr>
-            <a:endParaRPr lang="fr-FR" sz="2400" dirty="0" smtClean="0"/>
+            <a:endParaRPr lang="fr-FR" sz="2400" dirty="0"/>
           </a:p>
           <a:p>
             <a:pPr marL="0" indent="0" algn="ctr">
               <a:buNone/>
             </a:pPr>
             <a:r>
-              <a:rPr lang="fr-FR" sz="2400" dirty="0" smtClean="0"/>
-              <a:t>Note</a:t>
-            </a:r>
-            <a:r>
               <a:rPr lang="fr-FR" sz="2400" dirty="0"/>
-              <a:t>: vous recevrez une indemnisation financière de 2€</a:t>
+              <a:t>Si vous pensez que la difficulté d’un exercice est trop importante (en comparaison du bonus), vous pouvez refuser de l’effectuer. Vous avez aussi la possibilité de changer d’avis et de décider d’abandonner l’exercice en cours de route.</a:t>
+            </a:r>
+          </a:p>
+          <a:p>
+            <a:pPr marL="0" indent="0" algn="ctr">
+              <a:buNone/>
+            </a:pPr>
+            <a:endParaRPr lang="fr-FR" sz="2400" dirty="0"/>
+          </a:p>
+          <a:p>
+            <a:pPr marL="0" indent="0" algn="ctr">
+              <a:buNone/>
+            </a:pPr>
+            <a:r>
+              <a:rPr lang="fr-FR" sz="2400" dirty="0"/>
+              <a:t>Note: vous recevrez une indemnisation financière de 2€</a:t>
             </a:r>
             <a:r>
               <a:rPr lang="fr-FR" sz="2400" dirty="0">
@@ -6498,57 +5552,8 @@
             </a:r>
             <a:r>
               <a:rPr lang="fr-FR" sz="2400" dirty="0"/>
-              <a:t>pour avoir </a:t>
-            </a:r>
-            <a:r>
-              <a:rPr lang="fr-FR" sz="2400" dirty="0" smtClean="0"/>
-              <a:t>effectué ce test, </a:t>
-            </a:r>
-            <a:r>
-              <a:rPr lang="fr-FR" sz="2400" dirty="0"/>
-              <a:t>quelle que soit votre performance. De plus, nous sélectionnerons </a:t>
-            </a:r>
-            <a:r>
-              <a:rPr lang="fr-FR" sz="2400" dirty="0" smtClean="0"/>
-              <a:t>1 </a:t>
-            </a:r>
-            <a:r>
-              <a:rPr lang="fr-FR" sz="2400" dirty="0" smtClean="0"/>
-              <a:t>exercice </a:t>
-            </a:r>
-            <a:r>
-              <a:rPr lang="fr-FR" sz="2400" dirty="0" smtClean="0"/>
-              <a:t>au </a:t>
-            </a:r>
-            <a:r>
-              <a:rPr lang="fr-FR" sz="2400" dirty="0"/>
-              <a:t>hasard, et vous recevrez </a:t>
-            </a:r>
-            <a:r>
-              <a:rPr lang="fr-FR" sz="2400" dirty="0" smtClean="0"/>
-              <a:t>2 </a:t>
-            </a:r>
-            <a:r>
-              <a:rPr lang="fr-FR" sz="2400" dirty="0"/>
-              <a:t>euros </a:t>
-            </a:r>
-            <a:r>
-              <a:rPr lang="fr-FR" sz="2400" dirty="0" smtClean="0"/>
-              <a:t>si votre </a:t>
-            </a:r>
-            <a:r>
-              <a:rPr lang="fr-FR" sz="2400" dirty="0" smtClean="0"/>
-              <a:t>performance </a:t>
-            </a:r>
-            <a:r>
-              <a:rPr lang="fr-FR" sz="2400" dirty="0" smtClean="0"/>
-              <a:t>est </a:t>
-            </a:r>
-            <a:r>
-              <a:rPr lang="fr-FR" sz="2400" dirty="0" smtClean="0"/>
-              <a:t>adéquate.</a:t>
-            </a:r>
-            <a:endParaRPr lang="fr-FR" sz="2400" dirty="0"/>
+              <a:t>pour avoir effectué ce test, quelle que soit votre performance. De plus, nous sélectionnerons deux exercices au hasard parmi ceux que vous avez accomplis, et vous recevrez la récompenses correspondant à votre performance dans ces 2 exercices.</a:t>
+            </a:r>
           </a:p>
         </p:txBody>
       </p:sp>
@@ -6562,13 +5567,6 @@
   <p:clrMapOvr>
     <a:masterClrMapping/>
   </p:clrMapOvr>
-  <p:timing>
-    <p:tnLst>
-      <p:par>
-        <p:cTn id="1" dur="indefinite" restart="never" nodeType="tmRoot"/>
-      </p:par>
-    </p:tnLst>
-  </p:timing>
 </p:sld>
 </file>
 
@@ -6617,64 +5615,24 @@
               </a:spcAft>
             </a:pPr>
             <a:r>
-              <a:rPr lang="en-GB" sz="2400" dirty="0" err="1" smtClean="0"/>
+              <a:rPr lang="en-GB" sz="2400" dirty="0" err="1"/>
               <a:t>Lors</a:t>
             </a:r>
             <a:r>
-              <a:rPr lang="en-GB" sz="2400" dirty="0" smtClean="0"/>
+              <a:rPr lang="en-GB" sz="2400" dirty="0"/>
               <a:t> de </a:t>
             </a:r>
             <a:r>
-              <a:rPr lang="en-GB" sz="2400" dirty="0" err="1" smtClean="0"/>
+              <a:rPr lang="en-GB" sz="2400" dirty="0" err="1"/>
               <a:t>chaque</a:t>
             </a:r>
             <a:r>
-              <a:rPr lang="en-GB" sz="2400" dirty="0" smtClean="0"/>
+              <a:rPr lang="en-GB" sz="2400" dirty="0"/>
               <a:t> </a:t>
             </a:r>
             <a:r>
-              <a:rPr lang="fr-FR" sz="2400" dirty="0" smtClean="0"/>
-              <a:t>exercice de charge mentale, </a:t>
-            </a:r>
-            <a:r>
               <a:rPr lang="fr-FR" sz="2400" dirty="0"/>
-              <a:t>vous devrez observer </a:t>
-            </a:r>
-            <a:r>
-              <a:rPr lang="fr-FR" sz="2400" dirty="0" smtClean="0"/>
-              <a:t>une </a:t>
-            </a:r>
-            <a:r>
-              <a:rPr lang="fr-FR" sz="2400" dirty="0"/>
-              <a:t>séquences de lettres et </a:t>
-            </a:r>
-            <a:r>
-              <a:rPr lang="fr-FR" sz="2400" dirty="0" smtClean="0"/>
-              <a:t>de chiffres qui </a:t>
-            </a:r>
-            <a:r>
-              <a:rPr lang="fr-FR" sz="2400" dirty="0"/>
-              <a:t>changeront </a:t>
-            </a:r>
-            <a:r>
-              <a:rPr lang="fr-FR" sz="2400" dirty="0" smtClean="0"/>
-              <a:t>rapidement</a:t>
-            </a:r>
-            <a:r>
-              <a:rPr lang="fr-FR" sz="2400" dirty="0"/>
-              <a:t> </a:t>
-            </a:r>
-            <a:r>
-              <a:rPr lang="fr-FR" sz="2400" dirty="0" smtClean="0"/>
-              <a:t>(3 </a:t>
-            </a:r>
-            <a:r>
-              <a:rPr lang="fr-FR" sz="2400" dirty="0"/>
-              <a:t>fois par seconde</a:t>
-            </a:r>
-            <a:r>
-              <a:rPr lang="fr-FR" sz="2400" dirty="0" smtClean="0"/>
-              <a:t>). Les lettres et les chiffres sont disposés à gauche, au centre et à droite de l’écran:</a:t>
+              <a:t>exercice de charge mentale, vous devrez observer une séquences de lettres et de chiffres qui changeront rapidement (3 fois par seconde). Les lettres et les chiffres sont disposés à gauche, au centre et à droite de l’écran:</a:t>
             </a:r>
             <a:endParaRPr lang="fr-FR" sz="2400" b="1" u="sng" dirty="0"/>
           </a:p>
@@ -6795,18 +5753,13 @@
               </a:spcAft>
             </a:pPr>
             <a:r>
-              <a:rPr lang="en-GB" sz="2400" b="1" dirty="0" smtClean="0">
+              <a:rPr lang="en-GB" sz="2400" b="1" dirty="0">
                 <a:solidFill>
                   <a:srgbClr val="0070C0"/>
                 </a:solidFill>
               </a:rPr>
               <a:t>EXERCICE DE CHARGE MENTALE: PRÉSENTATION</a:t>
             </a:r>
-            <a:endParaRPr lang="en-GB" sz="2400" b="1" dirty="0">
-              <a:solidFill>
-                <a:srgbClr val="0070C0"/>
-              </a:solidFill>
-            </a:endParaRPr>
           </a:p>
         </p:txBody>
       </p:sp>
@@ -6881,39 +5834,23 @@
             </a:r>
             <a:r>
               <a:rPr lang="fr-FR" sz="2400" dirty="0"/>
-              <a:t>appuyer sur la barre d’espace </a:t>
-            </a:r>
-            <a:r>
-              <a:rPr lang="fr-FR" sz="2400" dirty="0" smtClean="0"/>
-              <a:t>du clavier lorsque </a:t>
-            </a:r>
-            <a:r>
-              <a:rPr lang="fr-FR" sz="2400" dirty="0"/>
-              <a:t>vous voyez le </a:t>
-            </a:r>
-            <a:r>
-              <a:rPr lang="fr-FR" sz="2400" dirty="0"/>
-              <a:t>« </a:t>
+              <a:t>appuyer sur la barre d’espace du clavier lorsque vous voyez le « </a:t>
             </a:r>
             <a:r>
               <a:rPr lang="fr-FR" sz="2400" b="1" dirty="0"/>
               <a:t>chiffre</a:t>
             </a:r>
             <a:r>
-              <a:rPr lang="en-GB" sz="2400" b="1" dirty="0" smtClean="0"/>
+              <a:rPr lang="en-GB" sz="2400" b="1" dirty="0"/>
               <a:t> </a:t>
             </a:r>
             <a:r>
-              <a:rPr lang="fr-FR" sz="2400" b="1" dirty="0" smtClean="0"/>
+              <a:rPr lang="fr-FR" sz="2400" b="1" dirty="0"/>
               <a:t>cibl</a:t>
             </a:r>
             <a:r>
-              <a:rPr lang="fr-FR" sz="2400" dirty="0" smtClean="0"/>
-              <a:t>e</a:t>
-            </a:r>
-            <a:r>
               <a:rPr lang="fr-FR" sz="2400" dirty="0"/>
-              <a:t> » </a:t>
+              <a:t>e » </a:t>
             </a:r>
             <a:r>
               <a:rPr lang="fr-FR" sz="2400" b="1" dirty="0"/>
@@ -6929,13 +5866,8 @@
             </a:r>
             <a:r>
               <a:rPr lang="fr-FR" sz="2400" dirty="0"/>
-              <a:t>la position </a:t>
-            </a:r>
-            <a:r>
-              <a:rPr lang="fr-FR" sz="2400" dirty="0" smtClean="0"/>
-              <a:t>centrale:</a:t>
-            </a:r>
-            <a:endParaRPr lang="fr-FR" sz="2400" dirty="0"/>
+              <a:t>la position centrale:</a:t>
+            </a:r>
           </a:p>
         </p:txBody>
       </p:sp>
@@ -7210,18 +6142,13 @@
               </a:spcAft>
             </a:pPr>
             <a:r>
-              <a:rPr lang="en-GB" sz="2400" b="1" dirty="0" smtClean="0">
+              <a:rPr lang="en-GB" sz="2400" b="1" dirty="0">
                 <a:solidFill>
                   <a:srgbClr val="0070C0"/>
                 </a:solidFill>
               </a:rPr>
               <a:t>EXERCICE DE CHARGE MENTALE: PRÉSENTATION</a:t>
             </a:r>
-            <a:endParaRPr lang="en-GB" sz="2400" b="1" dirty="0">
-              <a:solidFill>
-                <a:srgbClr val="0070C0"/>
-              </a:solidFill>
-            </a:endParaRPr>
           </a:p>
         </p:txBody>
       </p:sp>
@@ -7253,12 +6180,8 @@
               </a:spcAft>
             </a:pPr>
             <a:r>
-              <a:rPr lang="fr-FR" sz="2400" dirty="0" smtClean="0"/>
-              <a:t>Attention: vous </a:t>
-            </a:r>
-            <a:r>
               <a:rPr lang="fr-FR" sz="2400" dirty="0"/>
-              <a:t>n’avez qu’une seconde pour réagir !</a:t>
+              <a:t>Attention: vous n’avez qu’une seconde pour réagir !</a:t>
             </a:r>
           </a:p>
         </p:txBody>
@@ -7530,18 +6453,13 @@
               </a:spcAft>
             </a:pPr>
             <a:r>
-              <a:rPr lang="en-GB" sz="2400" b="1" dirty="0" smtClean="0">
+              <a:rPr lang="en-GB" sz="2400" b="1" dirty="0">
                 <a:solidFill>
                   <a:srgbClr val="0070C0"/>
                 </a:solidFill>
               </a:rPr>
               <a:t>EXERCICE DE CHARGE MENTALE: PRÉSENTATION</a:t>
             </a:r>
-            <a:endParaRPr lang="en-GB" sz="2400" b="1" dirty="0">
-              <a:solidFill>
-                <a:srgbClr val="0070C0"/>
-              </a:solidFill>
-            </a:endParaRPr>
           </a:p>
         </p:txBody>
       </p:sp>
@@ -7818,18 +6736,13 @@
               </a:spcAft>
             </a:pPr>
             <a:r>
-              <a:rPr lang="en-GB" sz="2400" b="1" dirty="0" smtClean="0">
+              <a:rPr lang="en-GB" sz="2400" b="1" dirty="0">
                 <a:solidFill>
                   <a:srgbClr val="0070C0"/>
                 </a:solidFill>
               </a:rPr>
               <a:t>EXERCICE DE CHARGE MENTALE: PRÉSENTATION</a:t>
             </a:r>
-            <a:endParaRPr lang="en-GB" sz="2400" b="1" dirty="0">
-              <a:solidFill>
-                <a:srgbClr val="0070C0"/>
-              </a:solidFill>
-            </a:endParaRPr>
           </a:p>
         </p:txBody>
       </p:sp>
@@ -7891,18 +6804,9 @@
               </a:spcAft>
             </a:pPr>
             <a:r>
-              <a:rPr lang="fr-FR" sz="2400" dirty="0" smtClean="0"/>
-              <a:t>Attention: au cours de chaque exercice, la </a:t>
-            </a:r>
-            <a:r>
               <a:rPr lang="fr-FR" sz="2400" dirty="0"/>
-              <a:t>position (gauche ou droite) du chiffre cible changera au cours de </a:t>
-            </a:r>
-            <a:r>
-              <a:rPr lang="fr-FR" sz="2400" dirty="0" smtClean="0"/>
-              <a:t>l’exercice.</a:t>
-            </a:r>
-            <a:endParaRPr lang="fr-FR" sz="2400" dirty="0"/>
+              <a:t>Attention: au cours de chaque exercice, la position (gauche ou droite) du chiffre cible changera au cours de l’exercice.</a:t>
+            </a:r>
           </a:p>
           <a:p>
             <a:pPr algn="ctr">
@@ -7910,7 +6814,7 @@
                 <a:spcPts val="600"/>
               </a:spcAft>
             </a:pPr>
-            <a:endParaRPr lang="fr-FR" sz="2400" dirty="0" smtClean="0"/>
+            <a:endParaRPr lang="fr-FR" sz="2400" dirty="0"/>
           </a:p>
           <a:p>
             <a:pPr algn="ctr">
@@ -7919,12 +6823,8 @@
               </a:spcAft>
             </a:pPr>
             <a:r>
-              <a:rPr lang="fr-FR" sz="2400" dirty="0" smtClean="0"/>
-              <a:t>Au début de </a:t>
-            </a:r>
-            <a:r>
               <a:rPr lang="fr-FR" sz="2400" dirty="0"/>
-              <a:t>chaque exercice</a:t>
+              <a:t>Au début de chaque exercice</a:t>
             </a:r>
             <a:r>
               <a:rPr lang="en-GB" sz="2400" dirty="0"/>
@@ -7952,25 +6852,20 @@
             </a:r>
             <a:r>
               <a:rPr lang="fr-FR" sz="2400" dirty="0"/>
-              <a:t> </a:t>
-            </a:r>
-            <a:r>
-              <a:rPr lang="fr-FR" sz="2400" dirty="0" smtClean="0"/>
-              <a:t>orientée vous indiquera la position (gauche ou droite) de la première cible qui </a:t>
-            </a:r>
-            <a:r>
-              <a:rPr lang="fr-FR" sz="2400" dirty="0" err="1" smtClean="0"/>
+              <a:t> orientée vous indiquera la position (gauche ou droite) de la première cible qui </a:t>
+            </a:r>
+            <a:r>
+              <a:rPr lang="fr-FR" sz="2400" dirty="0" err="1"/>
               <a:t>apparaîtr</a:t>
             </a:r>
             <a:r>
-              <a:rPr lang="en-GB" sz="2400" dirty="0" smtClean="0"/>
+              <a:rPr lang="en-GB" sz="2400" dirty="0"/>
               <a:t>a</a:t>
             </a:r>
             <a:r>
-              <a:rPr lang="fr-FR" sz="2400" dirty="0" smtClean="0"/>
+              <a:rPr lang="fr-FR" sz="2400" dirty="0"/>
               <a:t>:</a:t>
             </a:r>
-            <a:endParaRPr lang="fr-FR" sz="2400" dirty="0"/>
           </a:p>
         </p:txBody>
       </p:sp>
@@ -8095,18 +6990,13 @@
               </a:spcAft>
             </a:pPr>
             <a:r>
-              <a:rPr lang="en-GB" sz="2400" b="1" dirty="0" smtClean="0">
+              <a:rPr lang="en-GB" sz="2400" b="1" dirty="0">
                 <a:solidFill>
                   <a:srgbClr val="0070C0"/>
                 </a:solidFill>
               </a:rPr>
               <a:t>EXERCICE DE CHARGE MENTALE: DIFFICULTÉ</a:t>
             </a:r>
-            <a:endParaRPr lang="en-GB" sz="2400" b="1" dirty="0">
-              <a:solidFill>
-                <a:srgbClr val="0070C0"/>
-              </a:solidFill>
-            </a:endParaRPr>
           </a:p>
         </p:txBody>
       </p:sp>
@@ -8168,12 +7058,8 @@
               </a:spcAft>
             </a:pPr>
             <a:r>
-              <a:rPr lang="fr-FR" sz="2400" dirty="0" smtClean="0"/>
-              <a:t>Dans </a:t>
-            </a:r>
-            <a:r>
               <a:rPr lang="fr-FR" sz="2400" dirty="0"/>
-              <a:t>le mode « </a:t>
+              <a:t>Dans le mode « </a:t>
             </a:r>
             <a:r>
               <a:rPr lang="fr-FR" sz="2400" b="1" dirty="0"/>
@@ -8181,35 +7067,7 @@
             </a:r>
             <a:r>
               <a:rPr lang="fr-FR" sz="2400" dirty="0"/>
-              <a:t> », </a:t>
-            </a:r>
-            <a:r>
-              <a:rPr lang="fr-FR" sz="2400" dirty="0" smtClean="0"/>
-              <a:t>les </a:t>
-            </a:r>
-            <a:r>
-              <a:rPr lang="fr-FR" sz="2400" dirty="0"/>
-              <a:t>changements </a:t>
-            </a:r>
-            <a:r>
-              <a:rPr lang="fr-FR" sz="2400" dirty="0" smtClean="0"/>
-              <a:t>de position de la cible seront </a:t>
-            </a:r>
-            <a:r>
-              <a:rPr lang="fr-FR" sz="2400" dirty="0"/>
-              <a:t>indiqués par </a:t>
-            </a:r>
-            <a:r>
-              <a:rPr lang="fr-FR" sz="2400" dirty="0" smtClean="0"/>
-              <a:t>un </a:t>
-            </a:r>
-            <a:r>
-              <a:rPr lang="fr-FR" sz="2400" dirty="0"/>
-              <a:t>symbole fléché situé en position </a:t>
-            </a:r>
-            <a:r>
-              <a:rPr lang="fr-FR" sz="2400" dirty="0" smtClean="0"/>
-              <a:t>centrale.</a:t>
+              <a:t> », les changements de position de la cible seront indiqués par un symbole fléché situé en position centrale.</a:t>
             </a:r>
           </a:p>
           <a:p>
@@ -8220,21 +7078,8 @@
             </a:pPr>
             <a:r>
               <a:rPr lang="fr-FR" sz="2400" dirty="0"/>
-              <a:t>Dans l’exemple </a:t>
-            </a:r>
-            <a:r>
-              <a:rPr lang="fr-FR" sz="2400" dirty="0" smtClean="0"/>
-              <a:t>ci-dessous</a:t>
-            </a:r>
-            <a:r>
-              <a:rPr lang="fr-FR" sz="2400" dirty="0"/>
-              <a:t>, les prochaines cibles apparaîtront à </a:t>
-            </a:r>
-            <a:r>
-              <a:rPr lang="fr-FR" sz="2400" dirty="0" smtClean="0"/>
-              <a:t>droite:</a:t>
-            </a:r>
-            <a:endParaRPr lang="fr-FR" sz="2400" dirty="0"/>
+              <a:t>Dans l’exemple ci-dessous, les prochaines cibles apparaîtront à droite:</a:t>
+            </a:r>
           </a:p>
           <a:p>
             <a:pPr algn="ctr">
@@ -8242,7 +7087,7 @@
                 <a:spcPts val="600"/>
               </a:spcAft>
             </a:pPr>
-            <a:endParaRPr lang="fr-FR" sz="2400" dirty="0" smtClean="0"/>
+            <a:endParaRPr lang="fr-FR" sz="2400" dirty="0"/>
           </a:p>
           <a:p>
             <a:pPr algn="ctr">
@@ -8421,18 +7266,13 @@
               </a:spcAft>
             </a:pPr>
             <a:r>
-              <a:rPr lang="en-GB" sz="2400" b="1" dirty="0" smtClean="0">
+              <a:rPr lang="en-GB" sz="2400" b="1" dirty="0">
                 <a:solidFill>
                   <a:srgbClr val="0070C0"/>
                 </a:solidFill>
               </a:rPr>
               <a:t>EXERCICE DE CHARGE MENTALE: MODE FACILE</a:t>
             </a:r>
-            <a:endParaRPr lang="en-GB" sz="2400" b="1" dirty="0">
-              <a:solidFill>
-                <a:srgbClr val="0070C0"/>
-              </a:solidFill>
-            </a:endParaRPr>
           </a:p>
         </p:txBody>
       </p:sp>
@@ -8464,12 +7304,8 @@
               </a:spcAft>
             </a:pPr>
             <a:r>
-              <a:rPr lang="fr-FR" sz="2400" dirty="0" smtClean="0"/>
-              <a:t>Vous </a:t>
-            </a:r>
-            <a:r>
               <a:rPr lang="fr-FR" sz="2400" dirty="0"/>
-              <a:t>n’avez pas à r</a:t>
+              <a:t>Vous n’avez pas à r</a:t>
             </a:r>
             <a:r>
               <a:rPr lang="en-GB" sz="2400" dirty="0" err="1"/>
@@ -8477,29 +7313,8 @@
             </a:r>
             <a:r>
               <a:rPr lang="fr-FR" sz="2400" dirty="0"/>
-              <a:t> lorsque cela arrive, mais vous devez alors </a:t>
-            </a:r>
-            <a:r>
-              <a:rPr lang="fr-FR" sz="2400" dirty="0" smtClean="0"/>
-              <a:t>déplacer </a:t>
-            </a:r>
-            <a:r>
-              <a:rPr lang="fr-FR" sz="2400" dirty="0"/>
-              <a:t>rapidement votre attention </a:t>
-            </a:r>
-            <a:r>
-              <a:rPr lang="fr-FR" sz="2400" dirty="0" smtClean="0"/>
-              <a:t>vers la </a:t>
-            </a:r>
-            <a:r>
-              <a:rPr lang="fr-FR" sz="2400" dirty="0"/>
-              <a:t>position </a:t>
-            </a:r>
-            <a:r>
-              <a:rPr lang="fr-FR" sz="2400" dirty="0" smtClean="0"/>
-              <a:t>indiquée (ici: à droite).</a:t>
-            </a:r>
-            <a:endParaRPr lang="fr-FR" sz="2400" dirty="0"/>
+              <a:t> lorsque cela arrive, mais vous devez alors déplacer rapidement votre attention vers la position indiquée (ici: à droite).</a:t>
+            </a:r>
           </a:p>
         </p:txBody>
       </p:sp>
@@ -8561,12 +7376,8 @@
               </a:spcAft>
             </a:pPr>
             <a:r>
-              <a:rPr lang="fr-FR" sz="2400" dirty="0" smtClean="0"/>
-              <a:t>Dans </a:t>
-            </a:r>
-            <a:r>
               <a:rPr lang="fr-FR" sz="2400" dirty="0"/>
-              <a:t>le mode « </a:t>
+              <a:t>Dans le mode « </a:t>
             </a:r>
             <a:r>
               <a:rPr lang="fr-FR" sz="2400" b="1" dirty="0"/>
@@ -8574,13 +7385,8 @@
             </a:r>
             <a:r>
               <a:rPr lang="fr-FR" sz="2400" dirty="0"/>
-              <a:t> », les changements de position du chiffre cible ne seront pas indiqués (le symbole central sera symbole sera le nombre 3</a:t>
-            </a:r>
-            <a:r>
-              <a:rPr lang="fr-FR" sz="2400" dirty="0" smtClean="0"/>
-              <a:t>):</a:t>
-            </a:r>
-            <a:endParaRPr lang="fr-FR" sz="2400" dirty="0"/>
+              <a:t> », les changements de position du chiffre cible ne seront pas indiqués (le symbole central sera symbole sera le nombre 3):</a:t>
+            </a:r>
           </a:p>
         </p:txBody>
       </p:sp>
@@ -8751,18 +7557,13 @@
               </a:spcAft>
             </a:pPr>
             <a:r>
-              <a:rPr lang="en-GB" sz="2400" b="1" dirty="0" smtClean="0">
+              <a:rPr lang="en-GB" sz="2400" b="1" dirty="0">
                 <a:solidFill>
                   <a:srgbClr val="0070C0"/>
                 </a:solidFill>
               </a:rPr>
               <a:t>EXERCICE DE CHARGE MENTALE: MODE DIFFICILE</a:t>
             </a:r>
-            <a:endParaRPr lang="en-GB" sz="2400" b="1" dirty="0">
-              <a:solidFill>
-                <a:srgbClr val="0070C0"/>
-              </a:solidFill>
-            </a:endParaRPr>
           </a:p>
         </p:txBody>
       </p:sp>
@@ -8793,16 +7594,8 @@
               </a:spcAft>
             </a:pPr>
             <a:r>
-              <a:rPr lang="fr-FR" sz="2400" dirty="0" smtClean="0"/>
-              <a:t>Vous </a:t>
-            </a:r>
-            <a:r>
               <a:rPr lang="fr-FR" sz="2400" dirty="0"/>
-              <a:t>devrez donc détecter ces changements sans indice extérieur, </a:t>
-            </a:r>
-            <a:r>
-              <a:rPr lang="fr-FR" sz="2400" dirty="0" smtClean="0"/>
-              <a:t>en maintenant simultanément votre attention sur les deux positions possibles de la cible.</a:t>
+              <a:t>Vous devrez donc détecter ces changements sans indice extérieur, en maintenant simultanément votre attention sur les deux positions possibles de la cible.</a:t>
             </a:r>
           </a:p>
           <a:p>
@@ -8812,14 +7605,9 @@
               </a:spcAft>
             </a:pPr>
             <a:r>
-              <a:rPr lang="fr-FR" sz="2400" dirty="0" smtClean="0"/>
-              <a:t>Comme vous le verrez, ceci augmente nettement la </a:t>
-            </a:r>
-            <a:r>
               <a:rPr lang="fr-FR" sz="2400" dirty="0"/>
-              <a:t>charge mentale.</a:t>
-            </a:r>
-            <a:endParaRPr lang="fr-FR" sz="2400" dirty="0"/>
+              <a:t>Comme vous le verrez, ceci augmente nettement la charge mentale.</a:t>
+            </a:r>
           </a:p>
         </p:txBody>
       </p:sp>

</xml_diff>